<commit_message>
Templete - C - C++ - Brainf*** - img
- Edição no templete
- Utilização de sintaxe C++
- Brainf*** em Python para diminui as linhas
</commit_message>
<xml_diff>
--- a/Templete/Codigo e suas linguagens - Templete.pptx
+++ b/Templete/Codigo e suas linguagens - Templete.pptx
@@ -220,7 +220,7 @@
           <a:p>
             <a:fld id="{8F42E566-459B-4291-8411-523B07E86832}" type="datetimeFigureOut">
               <a:rPr lang="pt-BR" smtClean="0"/>
-              <a:t>01/10/2018</a:t>
+              <a:t>02/10/2018</a:t>
             </a:fld>
             <a:endParaRPr lang="pt-BR"/>
           </a:p>
@@ -817,7 +817,7 @@
           <a:p>
             <a:fld id="{CB80F9A9-F103-0044-8BC7-AF5B19ABA5FA}" type="datetimeFigureOut">
               <a:rPr lang="en-US" smtClean="0"/>
-              <a:t>10/1/2018</a:t>
+              <a:t>10/2/2018</a:t>
             </a:fld>
             <a:endParaRPr lang="en-US"/>
           </a:p>
@@ -987,7 +987,7 @@
           <a:p>
             <a:fld id="{CB80F9A9-F103-0044-8BC7-AF5B19ABA5FA}" type="datetimeFigureOut">
               <a:rPr lang="en-US" smtClean="0"/>
-              <a:t>10/1/2018</a:t>
+              <a:t>10/2/2018</a:t>
             </a:fld>
             <a:endParaRPr lang="en-US"/>
           </a:p>
@@ -1167,7 +1167,7 @@
           <a:p>
             <a:fld id="{CB80F9A9-F103-0044-8BC7-AF5B19ABA5FA}" type="datetimeFigureOut">
               <a:rPr lang="en-US" smtClean="0"/>
-              <a:t>10/1/2018</a:t>
+              <a:t>10/2/2018</a:t>
             </a:fld>
             <a:endParaRPr lang="en-US"/>
           </a:p>
@@ -1337,7 +1337,7 @@
           <a:p>
             <a:fld id="{CB80F9A9-F103-0044-8BC7-AF5B19ABA5FA}" type="datetimeFigureOut">
               <a:rPr lang="en-US" smtClean="0"/>
-              <a:t>10/1/2018</a:t>
+              <a:t>10/2/2018</a:t>
             </a:fld>
             <a:endParaRPr lang="en-US"/>
           </a:p>
@@ -1583,7 +1583,7 @@
           <a:p>
             <a:fld id="{CB80F9A9-F103-0044-8BC7-AF5B19ABA5FA}" type="datetimeFigureOut">
               <a:rPr lang="en-US" smtClean="0"/>
-              <a:t>10/1/2018</a:t>
+              <a:t>10/2/2018</a:t>
             </a:fld>
             <a:endParaRPr lang="en-US"/>
           </a:p>
@@ -1871,7 +1871,7 @@
           <a:p>
             <a:fld id="{CB80F9A9-F103-0044-8BC7-AF5B19ABA5FA}" type="datetimeFigureOut">
               <a:rPr lang="en-US" smtClean="0"/>
-              <a:t>10/1/2018</a:t>
+              <a:t>10/2/2018</a:t>
             </a:fld>
             <a:endParaRPr lang="en-US"/>
           </a:p>
@@ -2298,7 +2298,7 @@
           <a:p>
             <a:fld id="{CB80F9A9-F103-0044-8BC7-AF5B19ABA5FA}" type="datetimeFigureOut">
               <a:rPr lang="en-US" smtClean="0"/>
-              <a:t>10/1/2018</a:t>
+              <a:t>10/2/2018</a:t>
             </a:fld>
             <a:endParaRPr lang="en-US"/>
           </a:p>
@@ -2416,7 +2416,7 @@
           <a:p>
             <a:fld id="{CB80F9A9-F103-0044-8BC7-AF5B19ABA5FA}" type="datetimeFigureOut">
               <a:rPr lang="en-US" smtClean="0"/>
-              <a:t>10/1/2018</a:t>
+              <a:t>10/2/2018</a:t>
             </a:fld>
             <a:endParaRPr lang="en-US"/>
           </a:p>
@@ -2511,7 +2511,7 @@
           <a:p>
             <a:fld id="{CB80F9A9-F103-0044-8BC7-AF5B19ABA5FA}" type="datetimeFigureOut">
               <a:rPr lang="en-US" smtClean="0"/>
-              <a:t>10/1/2018</a:t>
+              <a:t>10/2/2018</a:t>
             </a:fld>
             <a:endParaRPr lang="en-US"/>
           </a:p>
@@ -2788,7 +2788,7 @@
           <a:p>
             <a:fld id="{CB80F9A9-F103-0044-8BC7-AF5B19ABA5FA}" type="datetimeFigureOut">
               <a:rPr lang="en-US" smtClean="0"/>
-              <a:t>10/1/2018</a:t>
+              <a:t>10/2/2018</a:t>
             </a:fld>
             <a:endParaRPr lang="en-US"/>
           </a:p>
@@ -3041,7 +3041,7 @@
           <a:p>
             <a:fld id="{CB80F9A9-F103-0044-8BC7-AF5B19ABA5FA}" type="datetimeFigureOut">
               <a:rPr lang="en-US" smtClean="0"/>
-              <a:t>10/1/2018</a:t>
+              <a:t>10/2/2018</a:t>
             </a:fld>
             <a:endParaRPr lang="en-US"/>
           </a:p>
@@ -3254,7 +3254,7 @@
           <a:p>
             <a:fld id="{CB80F9A9-F103-0044-8BC7-AF5B19ABA5FA}" type="datetimeFigureOut">
               <a:rPr lang="en-US" smtClean="0"/>
-              <a:t>10/1/2018</a:t>
+              <a:t>10/2/2018</a:t>
             </a:fld>
             <a:endParaRPr lang="en-US"/>
           </a:p>
@@ -3942,74 +3942,6 @@
       </p:sp>
       <p:sp>
         <p:nvSpPr>
-          <p:cNvPr id="15" name="CaixaDeTexto 61"/>
-          <p:cNvSpPr txBox="1"/>
-          <p:nvPr/>
-        </p:nvSpPr>
-        <p:spPr>
-          <a:xfrm>
-            <a:off x="626654" y="23810504"/>
-            <a:ext cx="9538785" cy="400110"/>
-          </a:xfrm>
-          <a:prstGeom prst="rect">
-            <a:avLst/>
-          </a:prstGeom>
-          <a:noFill/>
-        </p:spPr>
-        <p:txBody>
-          <a:bodyPr wrap="square" rtlCol="0">
-            <a:spAutoFit/>
-          </a:bodyPr>
-          <a:lstStyle/>
-          <a:p>
-            <a:pPr algn="ctr"/>
-            <a:r>
-              <a:rPr lang="pt-BR" sz="2000" i="1" dirty="0"/>
-              <a:t>Figura 1 – Sequência Metodológica. Fonte: Autoria própria</a:t>
-            </a:r>
-          </a:p>
-        </p:txBody>
-      </p:sp>
-      <p:sp>
-        <p:nvSpPr>
-          <p:cNvPr id="16" name="CaixaDeTexto 61"/>
-          <p:cNvSpPr txBox="1"/>
-          <p:nvPr/>
-        </p:nvSpPr>
-        <p:spPr>
-          <a:xfrm>
-            <a:off x="11172032" y="13670132"/>
-            <a:ext cx="9538784" cy="707886"/>
-          </a:xfrm>
-          <a:prstGeom prst="rect">
-            <a:avLst/>
-          </a:prstGeom>
-          <a:noFill/>
-        </p:spPr>
-        <p:txBody>
-          <a:bodyPr wrap="square" rtlCol="0">
-            <a:spAutoFit/>
-          </a:bodyPr>
-          <a:lstStyle/>
-          <a:p>
-            <a:pPr algn="ctr"/>
-            <a:r>
-              <a:rPr lang="pt-BR" sz="2000" i="1" dirty="0"/>
-              <a:t>Figura 2 – Protótipo do projeto ou outra imagem. Fonte: Robertson, 1993 </a:t>
-            </a:r>
-            <a:r>
-              <a:rPr lang="mr-IN" sz="2000" i="1" dirty="0"/>
-              <a:t>–</a:t>
-            </a:r>
-            <a:r>
-              <a:rPr lang="pt-BR" sz="2000" i="1" dirty="0"/>
-              <a:t> Colocar fonte quando necessário. </a:t>
-            </a:r>
-          </a:p>
-        </p:txBody>
-      </p:sp>
-      <p:sp>
-        <p:nvSpPr>
           <p:cNvPr id="18" name="CaixaDeTexto 37"/>
           <p:cNvSpPr txBox="1"/>
           <p:nvPr/>
@@ -4155,661 +4087,6 @@
             <a:r>
               <a:rPr lang="pt-BR" sz="2000" dirty="0"/>
               <a:t>(1) Engenharia de Computação.</a:t>
-            </a:r>
-          </a:p>
-        </p:txBody>
-      </p:sp>
-      <p:pic>
-        <p:nvPicPr>
-          <p:cNvPr id="21" name="Imagem 60"/>
-          <p:cNvPicPr>
-            <a:picLocks noChangeAspect="1"/>
-          </p:cNvPicPr>
-          <p:nvPr/>
-        </p:nvPicPr>
-        <p:blipFill>
-          <a:blip r:embed="rId4">
-            <a:extLst>
-              <a:ext uri="{28A0092B-C50C-407E-A947-70E740481C1C}">
-                <a14:useLocalDpi xmlns:a14="http://schemas.microsoft.com/office/drawing/2010/main" val="0"/>
-              </a:ext>
-            </a:extLst>
-          </a:blip>
-          <a:stretch>
-            <a:fillRect/>
-          </a:stretch>
-        </p:blipFill>
-        <p:spPr>
-          <a:xfrm>
-            <a:off x="13617608" y="14490680"/>
-            <a:ext cx="4669555" cy="3334808"/>
-          </a:xfrm>
-          <a:prstGeom prst="rect">
-            <a:avLst/>
-          </a:prstGeom>
-          <a:effectLst>
-            <a:softEdge rad="0"/>
-          </a:effectLst>
-        </p:spPr>
-      </p:pic>
-      <p:sp>
-        <p:nvSpPr>
-          <p:cNvPr id="22" name="Retângulo de cantos arredondados 23"/>
-          <p:cNvSpPr/>
-          <p:nvPr/>
-        </p:nvSpPr>
-        <p:spPr>
-          <a:xfrm>
-            <a:off x="3292077" y="24727293"/>
-            <a:ext cx="2246446" cy="851473"/>
-          </a:xfrm>
-          <a:prstGeom prst="roundRect">
-            <a:avLst/>
-          </a:prstGeom>
-        </p:spPr>
-        <p:style>
-          <a:lnRef idx="2">
-            <a:schemeClr val="accent1">
-              <a:shade val="50000"/>
-            </a:schemeClr>
-          </a:lnRef>
-          <a:fillRef idx="1">
-            <a:schemeClr val="accent1"/>
-          </a:fillRef>
-          <a:effectRef idx="0">
-            <a:schemeClr val="accent1"/>
-          </a:effectRef>
-          <a:fontRef idx="minor">
-            <a:schemeClr val="lt1"/>
-          </a:fontRef>
-        </p:style>
-        <p:txBody>
-          <a:bodyPr rtlCol="0" anchor="ctr"/>
-          <a:lstStyle/>
-          <a:p>
-            <a:pPr algn="ctr"/>
-            <a:r>
-              <a:rPr lang="pt-BR" sz="2000" dirty="0"/>
-              <a:t>Lavagem</a:t>
-            </a:r>
-          </a:p>
-        </p:txBody>
-      </p:sp>
-      <p:cxnSp>
-        <p:nvCxnSpPr>
-          <p:cNvPr id="23" name="Conector de seta reta 29"/>
-          <p:cNvCxnSpPr/>
-          <p:nvPr/>
-        </p:nvCxnSpPr>
-        <p:spPr>
-          <a:xfrm>
-            <a:off x="4372197" y="25578766"/>
-            <a:ext cx="0" cy="288032"/>
-          </a:xfrm>
-          <a:prstGeom prst="straightConnector1">
-            <a:avLst/>
-          </a:prstGeom>
-          <a:ln>
-            <a:tailEnd type="arrow"/>
-          </a:ln>
-        </p:spPr>
-        <p:style>
-          <a:lnRef idx="1">
-            <a:schemeClr val="accent1"/>
-          </a:lnRef>
-          <a:fillRef idx="0">
-            <a:schemeClr val="accent1"/>
-          </a:fillRef>
-          <a:effectRef idx="0">
-            <a:schemeClr val="accent1"/>
-          </a:effectRef>
-          <a:fontRef idx="minor">
-            <a:schemeClr val="tx1"/>
-          </a:fontRef>
-        </p:style>
-      </p:cxnSp>
-      <p:sp>
-        <p:nvSpPr>
-          <p:cNvPr id="24" name="CaixaDeTexto 41"/>
-          <p:cNvSpPr txBox="1"/>
-          <p:nvPr/>
-        </p:nvSpPr>
-        <p:spPr>
-          <a:xfrm>
-            <a:off x="3292077" y="24210614"/>
-            <a:ext cx="2246446" cy="461665"/>
-          </a:xfrm>
-          <a:prstGeom prst="rect">
-            <a:avLst/>
-          </a:prstGeom>
-          <a:noFill/>
-        </p:spPr>
-        <p:txBody>
-          <a:bodyPr wrap="square" rtlCol="0">
-            <a:spAutoFit/>
-          </a:bodyPr>
-          <a:lstStyle/>
-          <a:p>
-            <a:pPr algn="ctr"/>
-            <a:r>
-              <a:rPr lang="pt-BR" sz="2400" dirty="0"/>
-              <a:t>Etapa 1  </a:t>
-            </a:r>
-          </a:p>
-        </p:txBody>
-      </p:sp>
-      <p:sp>
-        <p:nvSpPr>
-          <p:cNvPr id="25" name="Retângulo de cantos arredondados 23"/>
-          <p:cNvSpPr/>
-          <p:nvPr/>
-        </p:nvSpPr>
-        <p:spPr>
-          <a:xfrm>
-            <a:off x="3292077" y="25866798"/>
-            <a:ext cx="2246446" cy="851473"/>
-          </a:xfrm>
-          <a:prstGeom prst="roundRect">
-            <a:avLst/>
-          </a:prstGeom>
-        </p:spPr>
-        <p:style>
-          <a:lnRef idx="2">
-            <a:schemeClr val="accent1">
-              <a:shade val="50000"/>
-            </a:schemeClr>
-          </a:lnRef>
-          <a:fillRef idx="1">
-            <a:schemeClr val="accent1"/>
-          </a:fillRef>
-          <a:effectRef idx="0">
-            <a:schemeClr val="accent1"/>
-          </a:effectRef>
-          <a:fontRef idx="minor">
-            <a:schemeClr val="lt1"/>
-          </a:fontRef>
-        </p:style>
-        <p:txBody>
-          <a:bodyPr rtlCol="0" anchor="ctr"/>
-          <a:lstStyle/>
-          <a:p>
-            <a:pPr algn="ctr"/>
-            <a:r>
-              <a:rPr lang="pt-BR" sz="2000" dirty="0"/>
-              <a:t>Processo de descascamento</a:t>
-            </a:r>
-          </a:p>
-        </p:txBody>
-      </p:sp>
-      <p:sp>
-        <p:nvSpPr>
-          <p:cNvPr id="26" name="Retângulo de cantos arredondados 23"/>
-          <p:cNvSpPr/>
-          <p:nvPr/>
-        </p:nvSpPr>
-        <p:spPr>
-          <a:xfrm>
-            <a:off x="3292077" y="27031549"/>
-            <a:ext cx="2246446" cy="851473"/>
-          </a:xfrm>
-          <a:prstGeom prst="roundRect">
-            <a:avLst/>
-          </a:prstGeom>
-        </p:spPr>
-        <p:style>
-          <a:lnRef idx="2">
-            <a:schemeClr val="accent1">
-              <a:shade val="50000"/>
-            </a:schemeClr>
-          </a:lnRef>
-          <a:fillRef idx="1">
-            <a:schemeClr val="accent1"/>
-          </a:fillRef>
-          <a:effectRef idx="0">
-            <a:schemeClr val="accent1"/>
-          </a:effectRef>
-          <a:fontRef idx="minor">
-            <a:schemeClr val="lt1"/>
-          </a:fontRef>
-        </p:style>
-        <p:txBody>
-          <a:bodyPr rtlCol="0" anchor="ctr"/>
-          <a:lstStyle/>
-          <a:p>
-            <a:pPr algn="ctr"/>
-            <a:r>
-              <a:rPr lang="pt-BR" sz="2000" dirty="0"/>
-              <a:t>Filtragem </a:t>
-            </a:r>
-          </a:p>
-        </p:txBody>
-      </p:sp>
-      <p:cxnSp>
-        <p:nvCxnSpPr>
-          <p:cNvPr id="27" name="Conector de seta reta 29"/>
-          <p:cNvCxnSpPr/>
-          <p:nvPr/>
-        </p:nvCxnSpPr>
-        <p:spPr>
-          <a:xfrm>
-            <a:off x="4372197" y="26718271"/>
-            <a:ext cx="0" cy="288032"/>
-          </a:xfrm>
-          <a:prstGeom prst="straightConnector1">
-            <a:avLst/>
-          </a:prstGeom>
-          <a:ln>
-            <a:tailEnd type="arrow"/>
-          </a:ln>
-        </p:spPr>
-        <p:style>
-          <a:lnRef idx="1">
-            <a:schemeClr val="accent1"/>
-          </a:lnRef>
-          <a:fillRef idx="0">
-            <a:schemeClr val="accent1"/>
-          </a:fillRef>
-          <a:effectRef idx="0">
-            <a:schemeClr val="accent1"/>
-          </a:effectRef>
-          <a:fontRef idx="minor">
-            <a:schemeClr val="tx1"/>
-          </a:fontRef>
-        </p:style>
-      </p:cxnSp>
-      <p:cxnSp>
-        <p:nvCxnSpPr>
-          <p:cNvPr id="28" name="Conector de seta reta 29"/>
-          <p:cNvCxnSpPr/>
-          <p:nvPr/>
-        </p:nvCxnSpPr>
-        <p:spPr>
-          <a:xfrm>
-            <a:off x="4372197" y="27883022"/>
-            <a:ext cx="0" cy="288032"/>
-          </a:xfrm>
-          <a:prstGeom prst="straightConnector1">
-            <a:avLst/>
-          </a:prstGeom>
-          <a:ln>
-            <a:tailEnd type="arrow"/>
-          </a:ln>
-        </p:spPr>
-        <p:style>
-          <a:lnRef idx="1">
-            <a:schemeClr val="accent1"/>
-          </a:lnRef>
-          <a:fillRef idx="0">
-            <a:schemeClr val="accent1"/>
-          </a:fillRef>
-          <a:effectRef idx="0">
-            <a:schemeClr val="accent1"/>
-          </a:effectRef>
-          <a:fontRef idx="minor">
-            <a:schemeClr val="tx1"/>
-          </a:fontRef>
-        </p:style>
-      </p:cxnSp>
-      <p:sp>
-        <p:nvSpPr>
-          <p:cNvPr id="29" name="Retângulo de cantos arredondados 23"/>
-          <p:cNvSpPr/>
-          <p:nvPr/>
-        </p:nvSpPr>
-        <p:spPr>
-          <a:xfrm>
-            <a:off x="3248974" y="28171054"/>
-            <a:ext cx="2246446" cy="851473"/>
-          </a:xfrm>
-          <a:prstGeom prst="roundRect">
-            <a:avLst/>
-          </a:prstGeom>
-        </p:spPr>
-        <p:style>
-          <a:lnRef idx="2">
-            <a:schemeClr val="accent1">
-              <a:shade val="50000"/>
-            </a:schemeClr>
-          </a:lnRef>
-          <a:fillRef idx="1">
-            <a:schemeClr val="accent1"/>
-          </a:fillRef>
-          <a:effectRef idx="0">
-            <a:schemeClr val="accent1"/>
-          </a:effectRef>
-          <a:fontRef idx="minor">
-            <a:schemeClr val="lt1"/>
-          </a:fontRef>
-        </p:style>
-        <p:txBody>
-          <a:bodyPr rtlCol="0" anchor="ctr"/>
-          <a:lstStyle/>
-          <a:p>
-            <a:pPr algn="ctr"/>
-            <a:r>
-              <a:rPr lang="pt-BR" sz="2000" dirty="0"/>
-              <a:t>Secagem  </a:t>
-            </a:r>
-          </a:p>
-        </p:txBody>
-      </p:sp>
-      <p:sp>
-        <p:nvSpPr>
-          <p:cNvPr id="30" name="Retângulo de cantos arredondados 23"/>
-          <p:cNvSpPr/>
-          <p:nvPr/>
-        </p:nvSpPr>
-        <p:spPr>
-          <a:xfrm>
-            <a:off x="5855460" y="24739916"/>
-            <a:ext cx="2246446" cy="851473"/>
-          </a:xfrm>
-          <a:prstGeom prst="roundRect">
-            <a:avLst/>
-          </a:prstGeom>
-          <a:solidFill>
-            <a:schemeClr val="accent6">
-              <a:lumMod val="75000"/>
-            </a:schemeClr>
-          </a:solidFill>
-        </p:spPr>
-        <p:style>
-          <a:lnRef idx="2">
-            <a:schemeClr val="accent1">
-              <a:shade val="50000"/>
-            </a:schemeClr>
-          </a:lnRef>
-          <a:fillRef idx="1">
-            <a:schemeClr val="accent1"/>
-          </a:fillRef>
-          <a:effectRef idx="0">
-            <a:schemeClr val="accent1"/>
-          </a:effectRef>
-          <a:fontRef idx="minor">
-            <a:schemeClr val="lt1"/>
-          </a:fontRef>
-        </p:style>
-        <p:txBody>
-          <a:bodyPr rtlCol="0" anchor="ctr"/>
-          <a:lstStyle/>
-          <a:p>
-            <a:pPr algn="ctr"/>
-            <a:r>
-              <a:rPr lang="pt-BR" sz="2000" dirty="0"/>
-              <a:t>Moagem</a:t>
-            </a:r>
-          </a:p>
-        </p:txBody>
-      </p:sp>
-      <p:cxnSp>
-        <p:nvCxnSpPr>
-          <p:cNvPr id="31" name="Conector de seta reta 29"/>
-          <p:cNvCxnSpPr/>
-          <p:nvPr/>
-        </p:nvCxnSpPr>
-        <p:spPr>
-          <a:xfrm>
-            <a:off x="6935580" y="25591389"/>
-            <a:ext cx="0" cy="288032"/>
-          </a:xfrm>
-          <a:prstGeom prst="straightConnector1">
-            <a:avLst/>
-          </a:prstGeom>
-          <a:ln>
-            <a:tailEnd type="arrow"/>
-          </a:ln>
-        </p:spPr>
-        <p:style>
-          <a:lnRef idx="1">
-            <a:schemeClr val="accent1"/>
-          </a:lnRef>
-          <a:fillRef idx="0">
-            <a:schemeClr val="accent1"/>
-          </a:fillRef>
-          <a:effectRef idx="0">
-            <a:schemeClr val="accent1"/>
-          </a:effectRef>
-          <a:fontRef idx="minor">
-            <a:schemeClr val="tx1"/>
-          </a:fontRef>
-        </p:style>
-      </p:cxnSp>
-      <p:sp>
-        <p:nvSpPr>
-          <p:cNvPr id="32" name="CaixaDeTexto 41"/>
-          <p:cNvSpPr txBox="1"/>
-          <p:nvPr/>
-        </p:nvSpPr>
-        <p:spPr>
-          <a:xfrm>
-            <a:off x="5855460" y="24223237"/>
-            <a:ext cx="2246446" cy="461665"/>
-          </a:xfrm>
-          <a:prstGeom prst="rect">
-            <a:avLst/>
-          </a:prstGeom>
-          <a:noFill/>
-        </p:spPr>
-        <p:txBody>
-          <a:bodyPr wrap="square" rtlCol="0">
-            <a:spAutoFit/>
-          </a:bodyPr>
-          <a:lstStyle/>
-          <a:p>
-            <a:pPr algn="ctr"/>
-            <a:r>
-              <a:rPr lang="pt-BR" sz="2400" dirty="0"/>
-              <a:t>Etapa 2  </a:t>
-            </a:r>
-          </a:p>
-        </p:txBody>
-      </p:sp>
-      <p:sp>
-        <p:nvSpPr>
-          <p:cNvPr id="33" name="Retângulo de cantos arredondados 23"/>
-          <p:cNvSpPr/>
-          <p:nvPr/>
-        </p:nvSpPr>
-        <p:spPr>
-          <a:xfrm>
-            <a:off x="5855460" y="25879421"/>
-            <a:ext cx="2246446" cy="851473"/>
-          </a:xfrm>
-          <a:prstGeom prst="roundRect">
-            <a:avLst/>
-          </a:prstGeom>
-          <a:solidFill>
-            <a:schemeClr val="accent6">
-              <a:lumMod val="75000"/>
-            </a:schemeClr>
-          </a:solidFill>
-        </p:spPr>
-        <p:style>
-          <a:lnRef idx="2">
-            <a:schemeClr val="accent1">
-              <a:shade val="50000"/>
-            </a:schemeClr>
-          </a:lnRef>
-          <a:fillRef idx="1">
-            <a:schemeClr val="accent1"/>
-          </a:fillRef>
-          <a:effectRef idx="0">
-            <a:schemeClr val="accent1"/>
-          </a:effectRef>
-          <a:fontRef idx="minor">
-            <a:schemeClr val="lt1"/>
-          </a:fontRef>
-        </p:style>
-        <p:txBody>
-          <a:bodyPr rtlCol="0" anchor="ctr"/>
-          <a:lstStyle/>
-          <a:p>
-            <a:pPr algn="ctr"/>
-            <a:r>
-              <a:rPr lang="pt-BR" sz="2000" dirty="0"/>
-              <a:t>Granulometria</a:t>
-            </a:r>
-          </a:p>
-        </p:txBody>
-      </p:sp>
-      <p:sp>
-        <p:nvSpPr>
-          <p:cNvPr id="34" name="Retângulo de cantos arredondados 23"/>
-          <p:cNvSpPr/>
-          <p:nvPr/>
-        </p:nvSpPr>
-        <p:spPr>
-          <a:xfrm>
-            <a:off x="5855460" y="27044172"/>
-            <a:ext cx="2246446" cy="851473"/>
-          </a:xfrm>
-          <a:prstGeom prst="roundRect">
-            <a:avLst/>
-          </a:prstGeom>
-          <a:solidFill>
-            <a:schemeClr val="accent6">
-              <a:lumMod val="75000"/>
-            </a:schemeClr>
-          </a:solidFill>
-        </p:spPr>
-        <p:style>
-          <a:lnRef idx="2">
-            <a:schemeClr val="accent1">
-              <a:shade val="50000"/>
-            </a:schemeClr>
-          </a:lnRef>
-          <a:fillRef idx="1">
-            <a:schemeClr val="accent1"/>
-          </a:fillRef>
-          <a:effectRef idx="0">
-            <a:schemeClr val="accent1"/>
-          </a:effectRef>
-          <a:fontRef idx="minor">
-            <a:schemeClr val="lt1"/>
-          </a:fontRef>
-        </p:style>
-        <p:txBody>
-          <a:bodyPr rtlCol="0" anchor="ctr"/>
-          <a:lstStyle/>
-          <a:p>
-            <a:pPr algn="ctr"/>
-            <a:r>
-              <a:rPr lang="pt-BR" sz="2000" dirty="0"/>
-              <a:t>Ensaios </a:t>
-            </a:r>
-          </a:p>
-        </p:txBody>
-      </p:sp>
-      <p:cxnSp>
-        <p:nvCxnSpPr>
-          <p:cNvPr id="35" name="Conector de seta reta 29"/>
-          <p:cNvCxnSpPr/>
-          <p:nvPr/>
-        </p:nvCxnSpPr>
-        <p:spPr>
-          <a:xfrm>
-            <a:off x="6935580" y="26730894"/>
-            <a:ext cx="0" cy="288032"/>
-          </a:xfrm>
-          <a:prstGeom prst="straightConnector1">
-            <a:avLst/>
-          </a:prstGeom>
-          <a:ln>
-            <a:tailEnd type="arrow"/>
-          </a:ln>
-        </p:spPr>
-        <p:style>
-          <a:lnRef idx="1">
-            <a:schemeClr val="accent1"/>
-          </a:lnRef>
-          <a:fillRef idx="0">
-            <a:schemeClr val="accent1"/>
-          </a:fillRef>
-          <a:effectRef idx="0">
-            <a:schemeClr val="accent1"/>
-          </a:effectRef>
-          <a:fontRef idx="minor">
-            <a:schemeClr val="tx1"/>
-          </a:fontRef>
-        </p:style>
-      </p:cxnSp>
-      <p:cxnSp>
-        <p:nvCxnSpPr>
-          <p:cNvPr id="36" name="Conector de seta reta 29"/>
-          <p:cNvCxnSpPr/>
-          <p:nvPr/>
-        </p:nvCxnSpPr>
-        <p:spPr>
-          <a:xfrm>
-            <a:off x="6935580" y="27895645"/>
-            <a:ext cx="0" cy="288032"/>
-          </a:xfrm>
-          <a:prstGeom prst="straightConnector1">
-            <a:avLst/>
-          </a:prstGeom>
-          <a:ln>
-            <a:tailEnd type="arrow"/>
-          </a:ln>
-        </p:spPr>
-        <p:style>
-          <a:lnRef idx="1">
-            <a:schemeClr val="accent1"/>
-          </a:lnRef>
-          <a:fillRef idx="0">
-            <a:schemeClr val="accent1"/>
-          </a:fillRef>
-          <a:effectRef idx="0">
-            <a:schemeClr val="accent1"/>
-          </a:effectRef>
-          <a:fontRef idx="minor">
-            <a:schemeClr val="tx1"/>
-          </a:fontRef>
-        </p:style>
-      </p:cxnSp>
-      <p:sp>
-        <p:nvSpPr>
-          <p:cNvPr id="37" name="Retângulo de cantos arredondados 23"/>
-          <p:cNvSpPr/>
-          <p:nvPr/>
-        </p:nvSpPr>
-        <p:spPr>
-          <a:xfrm>
-            <a:off x="5812357" y="28183677"/>
-            <a:ext cx="2246446" cy="851473"/>
-          </a:xfrm>
-          <a:prstGeom prst="roundRect">
-            <a:avLst/>
-          </a:prstGeom>
-          <a:solidFill>
-            <a:schemeClr val="accent6">
-              <a:lumMod val="75000"/>
-            </a:schemeClr>
-          </a:solidFill>
-        </p:spPr>
-        <p:style>
-          <a:lnRef idx="2">
-            <a:schemeClr val="accent1">
-              <a:shade val="50000"/>
-            </a:schemeClr>
-          </a:lnRef>
-          <a:fillRef idx="1">
-            <a:schemeClr val="accent1"/>
-          </a:fillRef>
-          <a:effectRef idx="0">
-            <a:schemeClr val="accent1"/>
-          </a:effectRef>
-          <a:fontRef idx="minor">
-            <a:schemeClr val="lt1"/>
-          </a:fontRef>
-        </p:style>
-        <p:txBody>
-          <a:bodyPr rtlCol="0" anchor="ctr"/>
-          <a:lstStyle/>
-          <a:p>
-            <a:pPr algn="ctr"/>
-            <a:r>
-              <a:rPr lang="pt-BR" sz="2000" dirty="0"/>
-              <a:t>Fim  </a:t>
             </a:r>
           </a:p>
         </p:txBody>
@@ -4918,7 +4195,7 @@
         <p:spPr>
           <a:xfrm>
             <a:off x="626654" y="15354021"/>
-            <a:ext cx="9538785" cy="8556187"/>
+            <a:ext cx="9538785" cy="1231106"/>
           </a:xfrm>
           <a:prstGeom prst="rect">
             <a:avLst/>
@@ -4947,1275 +4224,7 @@
               <a:rPr lang="pt-BR" sz="2800" dirty="0" err="1"/>
               <a:t>Xoxoox</a:t>
             </a:r>
-            <a:r>
-              <a:rPr lang="pt-BR" sz="2800" dirty="0"/>
-              <a:t> </a:t>
-            </a:r>
-            <a:r>
-              <a:rPr lang="pt-BR" sz="2800" dirty="0" err="1"/>
-              <a:t>ox</a:t>
-            </a:r>
-            <a:r>
-              <a:rPr lang="pt-BR" sz="2800" dirty="0"/>
-              <a:t> </a:t>
-            </a:r>
-            <a:r>
-              <a:rPr lang="pt-BR" sz="2800" dirty="0" err="1"/>
-              <a:t>oox</a:t>
-            </a:r>
-            <a:r>
-              <a:rPr lang="pt-BR" sz="2800" dirty="0"/>
-              <a:t> </a:t>
-            </a:r>
-            <a:r>
-              <a:rPr lang="pt-BR" sz="2800" dirty="0" err="1"/>
-              <a:t>xoooxoox</a:t>
-            </a:r>
-            <a:r>
-              <a:rPr lang="pt-BR" sz="2800" dirty="0"/>
-              <a:t> </a:t>
-            </a:r>
-            <a:r>
-              <a:rPr lang="pt-BR" sz="2800" dirty="0" err="1"/>
-              <a:t>ox</a:t>
-            </a:r>
-            <a:r>
-              <a:rPr lang="pt-BR" sz="2800" dirty="0"/>
-              <a:t> </a:t>
-            </a:r>
-            <a:r>
-              <a:rPr lang="pt-BR" sz="2800" dirty="0" err="1"/>
-              <a:t>oxo</a:t>
-            </a:r>
-            <a:r>
-              <a:rPr lang="pt-BR" sz="2800" dirty="0"/>
-              <a:t> </a:t>
-            </a:r>
-            <a:r>
-              <a:rPr lang="pt-BR" sz="2800" dirty="0" err="1"/>
-              <a:t>ox</a:t>
-            </a:r>
-            <a:r>
-              <a:rPr lang="pt-BR" sz="2800" dirty="0"/>
-              <a:t> </a:t>
-            </a:r>
-            <a:r>
-              <a:rPr lang="pt-BR" sz="2800" dirty="0" err="1"/>
-              <a:t>ox</a:t>
-            </a:r>
-            <a:r>
-              <a:rPr lang="pt-BR" sz="2800" dirty="0"/>
-              <a:t> </a:t>
-            </a:r>
-            <a:r>
-              <a:rPr lang="pt-BR" sz="2800" dirty="0" err="1"/>
-              <a:t>oxo</a:t>
-            </a:r>
-            <a:r>
-              <a:rPr lang="pt-BR" sz="2800" dirty="0"/>
-              <a:t> </a:t>
-            </a:r>
-            <a:r>
-              <a:rPr lang="pt-BR" sz="2800" dirty="0" err="1"/>
-              <a:t>oxoox</a:t>
-            </a:r>
-            <a:r>
-              <a:rPr lang="pt-BR" sz="2800" dirty="0"/>
-              <a:t> </a:t>
-            </a:r>
-            <a:r>
-              <a:rPr lang="pt-BR" sz="2800" dirty="0" err="1"/>
-              <a:t>xo</a:t>
-            </a:r>
-            <a:r>
-              <a:rPr lang="pt-BR" sz="2800" dirty="0"/>
-              <a:t> </a:t>
-            </a:r>
-            <a:r>
-              <a:rPr lang="pt-BR" sz="2800" dirty="0" err="1"/>
-              <a:t>oox</a:t>
-            </a:r>
-            <a:r>
-              <a:rPr lang="pt-BR" sz="2800" dirty="0"/>
-              <a:t> </a:t>
-            </a:r>
-            <a:r>
-              <a:rPr lang="pt-BR" sz="2800" dirty="0" err="1"/>
-              <a:t>oxoxo</a:t>
-            </a:r>
-            <a:r>
-              <a:rPr lang="pt-BR" sz="2800" dirty="0"/>
-              <a:t> </a:t>
-            </a:r>
-            <a:r>
-              <a:rPr lang="pt-BR" sz="2800" dirty="0" err="1"/>
-              <a:t>xoxooxoxooxo</a:t>
-            </a:r>
-            <a:r>
-              <a:rPr lang="pt-BR" sz="2800" dirty="0"/>
-              <a:t> </a:t>
-            </a:r>
-            <a:r>
-              <a:rPr lang="pt-BR" sz="2800" dirty="0" err="1"/>
-              <a:t>xoo</a:t>
-            </a:r>
-            <a:r>
-              <a:rPr lang="pt-BR" sz="2800" dirty="0"/>
-              <a:t> </a:t>
-            </a:r>
-            <a:r>
-              <a:rPr lang="pt-BR" sz="2800" dirty="0" err="1"/>
-              <a:t>xox</a:t>
-            </a:r>
-            <a:r>
-              <a:rPr lang="pt-BR" sz="2800" dirty="0"/>
-              <a:t> </a:t>
-            </a:r>
-            <a:r>
-              <a:rPr lang="pt-BR" sz="2800" dirty="0" err="1"/>
-              <a:t>oxox</a:t>
-            </a:r>
-            <a:r>
-              <a:rPr lang="pt-BR" sz="2800" dirty="0"/>
-              <a:t> </a:t>
-            </a:r>
-            <a:r>
-              <a:rPr lang="pt-BR" sz="2800" dirty="0" err="1"/>
-              <a:t>ox</a:t>
-            </a:r>
-            <a:r>
-              <a:rPr lang="pt-BR" sz="2800" dirty="0"/>
-              <a:t> </a:t>
-            </a:r>
-            <a:r>
-              <a:rPr lang="pt-BR" sz="2800" dirty="0" err="1"/>
-              <a:t>ooxo</a:t>
-            </a:r>
-            <a:r>
-              <a:rPr lang="pt-BR" sz="2800" dirty="0"/>
-              <a:t> </a:t>
-            </a:r>
-            <a:r>
-              <a:rPr lang="pt-BR" sz="2800" dirty="0" err="1"/>
-              <a:t>xo</a:t>
-            </a:r>
-            <a:r>
-              <a:rPr lang="pt-BR" sz="2800" dirty="0"/>
-              <a:t> </a:t>
-            </a:r>
-            <a:r>
-              <a:rPr lang="pt-BR" sz="2800" dirty="0" err="1"/>
-              <a:t>ox</a:t>
-            </a:r>
-            <a:r>
-              <a:rPr lang="pt-BR" sz="2800" dirty="0"/>
-              <a:t> </a:t>
-            </a:r>
-            <a:r>
-              <a:rPr lang="pt-BR" sz="2800" dirty="0" err="1"/>
-              <a:t>ox</a:t>
-            </a:r>
-            <a:r>
-              <a:rPr lang="pt-BR" sz="2800" dirty="0"/>
-              <a:t> </a:t>
-            </a:r>
-            <a:r>
-              <a:rPr lang="pt-BR" sz="2800" dirty="0" err="1"/>
-              <a:t>oo</a:t>
-            </a:r>
-            <a:r>
-              <a:rPr lang="pt-BR" sz="2800" dirty="0"/>
-              <a:t> </a:t>
-            </a:r>
-            <a:r>
-              <a:rPr lang="pt-BR" sz="2800" dirty="0" err="1"/>
-              <a:t>xo</a:t>
-            </a:r>
-            <a:r>
-              <a:rPr lang="pt-BR" sz="2800" dirty="0"/>
-              <a:t> </a:t>
-            </a:r>
-            <a:r>
-              <a:rPr lang="pt-BR" sz="2800" dirty="0" err="1"/>
-              <a:t>ox</a:t>
-            </a:r>
-            <a:r>
-              <a:rPr lang="pt-BR" sz="2800" dirty="0"/>
-              <a:t> </a:t>
-            </a:r>
-            <a:r>
-              <a:rPr lang="pt-BR" sz="2800" dirty="0" err="1"/>
-              <a:t>ox</a:t>
-            </a:r>
-            <a:r>
-              <a:rPr lang="pt-BR" sz="2800" dirty="0"/>
-              <a:t> </a:t>
-            </a:r>
-            <a:r>
-              <a:rPr lang="pt-BR" sz="2800" dirty="0" err="1"/>
-              <a:t>ox</a:t>
-            </a:r>
-            <a:r>
-              <a:rPr lang="pt-BR" sz="2800" dirty="0"/>
-              <a:t> </a:t>
-            </a:r>
-            <a:r>
-              <a:rPr lang="pt-BR" sz="2800" dirty="0" err="1"/>
-              <a:t>ox</a:t>
-            </a:r>
-            <a:r>
-              <a:rPr lang="pt-BR" sz="2800" dirty="0"/>
-              <a:t>. </a:t>
-            </a:r>
-          </a:p>
-          <a:p>
-            <a:pPr lvl="0" algn="just"/>
-            <a:r>
-              <a:rPr lang="pt-BR" sz="2800" dirty="0" err="1"/>
-              <a:t>Xxoox</a:t>
-            </a:r>
-            <a:r>
-              <a:rPr lang="pt-BR" sz="2800" dirty="0"/>
-              <a:t> </a:t>
-            </a:r>
-            <a:r>
-              <a:rPr lang="pt-BR" sz="2800" dirty="0" err="1"/>
-              <a:t>xo</a:t>
-            </a:r>
-            <a:r>
-              <a:rPr lang="pt-BR" sz="2800" dirty="0"/>
-              <a:t> </a:t>
-            </a:r>
-            <a:r>
-              <a:rPr lang="pt-BR" sz="2800" dirty="0" err="1"/>
-              <a:t>oox</a:t>
-            </a:r>
-            <a:r>
-              <a:rPr lang="pt-BR" sz="2800" dirty="0"/>
-              <a:t> </a:t>
-            </a:r>
-            <a:r>
-              <a:rPr lang="pt-BR" sz="2800" dirty="0" err="1"/>
-              <a:t>oxoxo</a:t>
-            </a:r>
-            <a:r>
-              <a:rPr lang="pt-BR" sz="2800" dirty="0"/>
-              <a:t> </a:t>
-            </a:r>
-            <a:r>
-              <a:rPr lang="pt-BR" sz="2800" dirty="0" err="1"/>
-              <a:t>xoxooxoxooxo</a:t>
-            </a:r>
-            <a:r>
-              <a:rPr lang="pt-BR" sz="2800" dirty="0"/>
-              <a:t> </a:t>
-            </a:r>
-            <a:r>
-              <a:rPr lang="pt-BR" sz="2800" dirty="0" err="1"/>
-              <a:t>xoo</a:t>
-            </a:r>
-            <a:r>
-              <a:rPr lang="pt-BR" sz="2800" dirty="0"/>
-              <a:t> </a:t>
-            </a:r>
-            <a:r>
-              <a:rPr lang="pt-BR" sz="2800" dirty="0" err="1"/>
-              <a:t>xox</a:t>
-            </a:r>
-            <a:r>
-              <a:rPr lang="pt-BR" sz="2800" dirty="0"/>
-              <a:t> </a:t>
-            </a:r>
-            <a:r>
-              <a:rPr lang="pt-BR" sz="2800" dirty="0" err="1"/>
-              <a:t>oxox</a:t>
-            </a:r>
-            <a:r>
-              <a:rPr lang="pt-BR" sz="2800" dirty="0"/>
-              <a:t> </a:t>
-            </a:r>
-            <a:r>
-              <a:rPr lang="pt-BR" sz="2800" dirty="0" err="1"/>
-              <a:t>ox</a:t>
-            </a:r>
-            <a:r>
-              <a:rPr lang="pt-BR" sz="2800" dirty="0"/>
-              <a:t> </a:t>
-            </a:r>
-            <a:r>
-              <a:rPr lang="pt-BR" sz="2800" dirty="0" err="1"/>
-              <a:t>ooxo</a:t>
-            </a:r>
-            <a:r>
-              <a:rPr lang="pt-BR" sz="2800" dirty="0"/>
-              <a:t> </a:t>
-            </a:r>
-            <a:r>
-              <a:rPr lang="pt-BR" sz="2800" dirty="0" err="1"/>
-              <a:t>xo</a:t>
-            </a:r>
-            <a:r>
-              <a:rPr lang="pt-BR" sz="2800" dirty="0"/>
-              <a:t> </a:t>
-            </a:r>
-            <a:r>
-              <a:rPr lang="pt-BR" sz="2800" dirty="0" err="1"/>
-              <a:t>ox</a:t>
-            </a:r>
-            <a:r>
-              <a:rPr lang="pt-BR" sz="2800" dirty="0"/>
-              <a:t> </a:t>
-            </a:r>
-            <a:r>
-              <a:rPr lang="pt-BR" sz="2800" dirty="0" err="1"/>
-              <a:t>Xoxooxx</a:t>
-            </a:r>
-            <a:r>
-              <a:rPr lang="pt-BR" sz="2800" dirty="0"/>
-              <a:t>  xoxo </a:t>
-            </a:r>
-            <a:r>
-              <a:rPr lang="pt-BR" sz="2800" dirty="0" err="1"/>
-              <a:t>xo</a:t>
-            </a:r>
-            <a:r>
-              <a:rPr lang="pt-BR" sz="2800" dirty="0"/>
-              <a:t> </a:t>
-            </a:r>
-            <a:r>
-              <a:rPr lang="pt-BR" sz="2800" dirty="0" err="1"/>
-              <a:t>xpxoxooxooxo</a:t>
-            </a:r>
-            <a:r>
-              <a:rPr lang="pt-BR" sz="2800" dirty="0"/>
-              <a:t> (Metha, 2008).</a:t>
-            </a:r>
-          </a:p>
-          <a:p>
-            <a:pPr lvl="0" algn="just"/>
-            <a:r>
-              <a:rPr lang="pt-BR" sz="2800" dirty="0" err="1"/>
-              <a:t>Xx</a:t>
-            </a:r>
-            <a:r>
-              <a:rPr lang="pt-BR" sz="2800" dirty="0"/>
-              <a:t> </a:t>
-            </a:r>
-            <a:r>
-              <a:rPr lang="pt-BR" sz="2800" dirty="0" err="1"/>
-              <a:t>oo</a:t>
-            </a:r>
-            <a:r>
-              <a:rPr lang="pt-BR" sz="2800" dirty="0"/>
-              <a:t> </a:t>
-            </a:r>
-            <a:r>
-              <a:rPr lang="pt-BR" sz="2800" dirty="0" err="1"/>
-              <a:t>xo</a:t>
-            </a:r>
-            <a:r>
-              <a:rPr lang="pt-BR" sz="2800" dirty="0"/>
-              <a:t> </a:t>
-            </a:r>
-            <a:r>
-              <a:rPr lang="pt-BR" sz="2800" dirty="0" err="1"/>
-              <a:t>ox</a:t>
-            </a:r>
-            <a:r>
-              <a:rPr lang="pt-BR" sz="2800" dirty="0"/>
-              <a:t> </a:t>
-            </a:r>
-            <a:r>
-              <a:rPr lang="pt-BR" sz="2800" dirty="0" err="1"/>
-              <a:t>ox</a:t>
-            </a:r>
-            <a:r>
-              <a:rPr lang="pt-BR" sz="2800" dirty="0"/>
-              <a:t> </a:t>
-            </a:r>
-            <a:r>
-              <a:rPr lang="pt-BR" sz="2800" dirty="0" err="1"/>
-              <a:t>ox</a:t>
-            </a:r>
-            <a:r>
-              <a:rPr lang="pt-BR" sz="2800" dirty="0"/>
-              <a:t> </a:t>
-            </a:r>
-            <a:r>
-              <a:rPr lang="pt-BR" sz="2800" dirty="0" err="1"/>
-              <a:t>ox</a:t>
-            </a:r>
-            <a:r>
-              <a:rPr lang="pt-BR" sz="2800" dirty="0"/>
-              <a:t> </a:t>
-            </a:r>
-            <a:r>
-              <a:rPr lang="pt-BR" sz="2800" dirty="0" err="1"/>
-              <a:t>ocooc</a:t>
-            </a:r>
-            <a:r>
-              <a:rPr lang="pt-BR" sz="2800" dirty="0"/>
-              <a:t> </a:t>
-            </a:r>
-            <a:r>
-              <a:rPr lang="pt-BR" sz="2800" dirty="0" err="1"/>
-              <a:t>Xoo</a:t>
-            </a:r>
-            <a:r>
-              <a:rPr lang="pt-BR" sz="2800" dirty="0"/>
-              <a:t> </a:t>
-            </a:r>
-            <a:r>
-              <a:rPr lang="pt-BR" sz="2800" dirty="0" err="1"/>
-              <a:t>xo</a:t>
-            </a:r>
-            <a:r>
-              <a:rPr lang="pt-BR" sz="2800" dirty="0"/>
-              <a:t> </a:t>
-            </a:r>
-            <a:r>
-              <a:rPr lang="pt-BR" sz="2800" dirty="0" err="1"/>
-              <a:t>xoxoxo</a:t>
-            </a:r>
-            <a:r>
-              <a:rPr lang="pt-BR" sz="2800" dirty="0"/>
-              <a:t> </a:t>
-            </a:r>
-            <a:r>
-              <a:rPr lang="pt-BR" sz="2800" dirty="0" err="1"/>
-              <a:t>xoxooxox</a:t>
-            </a:r>
-            <a:r>
-              <a:rPr lang="pt-BR" sz="2800" dirty="0"/>
-              <a:t> </a:t>
-            </a:r>
-            <a:r>
-              <a:rPr lang="pt-BR" sz="2800" dirty="0" err="1"/>
-              <a:t>xoxox</a:t>
-            </a:r>
-            <a:r>
-              <a:rPr lang="pt-BR" sz="2800" dirty="0"/>
-              <a:t> xoxo </a:t>
-            </a:r>
-            <a:r>
-              <a:rPr lang="pt-BR" sz="2800" dirty="0" err="1"/>
-              <a:t>xxxxxxxxxxxo</a:t>
-            </a:r>
-            <a:r>
-              <a:rPr lang="pt-BR" sz="2800" dirty="0"/>
-              <a:t> </a:t>
-            </a:r>
-            <a:r>
-              <a:rPr lang="pt-BR" sz="2800" dirty="0" err="1"/>
-              <a:t>xo</a:t>
-            </a:r>
-            <a:r>
-              <a:rPr lang="pt-BR" sz="2800" dirty="0"/>
-              <a:t>.</a:t>
-            </a:r>
-          </a:p>
-          <a:p>
-            <a:pPr lvl="0" algn="just"/>
-            <a:r>
-              <a:rPr lang="pt-BR" sz="2800" dirty="0" err="1"/>
-              <a:t>Xxoox</a:t>
-            </a:r>
-            <a:r>
-              <a:rPr lang="pt-BR" sz="2800" dirty="0"/>
-              <a:t> </a:t>
-            </a:r>
-            <a:r>
-              <a:rPr lang="pt-BR" sz="2800" dirty="0" err="1"/>
-              <a:t>xo</a:t>
-            </a:r>
-            <a:r>
-              <a:rPr lang="pt-BR" sz="2800" dirty="0"/>
-              <a:t> </a:t>
-            </a:r>
-            <a:r>
-              <a:rPr lang="pt-BR" sz="2800" dirty="0" err="1"/>
-              <a:t>oox</a:t>
-            </a:r>
-            <a:r>
-              <a:rPr lang="pt-BR" sz="2800" dirty="0"/>
-              <a:t> </a:t>
-            </a:r>
-            <a:r>
-              <a:rPr lang="pt-BR" sz="2800" dirty="0" err="1"/>
-              <a:t>oxoxo</a:t>
-            </a:r>
-            <a:r>
-              <a:rPr lang="pt-BR" sz="2800" dirty="0"/>
-              <a:t> </a:t>
-            </a:r>
-            <a:r>
-              <a:rPr lang="pt-BR" sz="2800" dirty="0" err="1"/>
-              <a:t>xoxooxoxooxo</a:t>
-            </a:r>
-            <a:r>
-              <a:rPr lang="pt-BR" sz="2800" dirty="0"/>
-              <a:t> </a:t>
-            </a:r>
-            <a:r>
-              <a:rPr lang="pt-BR" sz="2800" dirty="0" err="1"/>
-              <a:t>xoo</a:t>
-            </a:r>
-            <a:r>
-              <a:rPr lang="pt-BR" sz="2800" dirty="0"/>
-              <a:t> </a:t>
-            </a:r>
-            <a:r>
-              <a:rPr lang="pt-BR" sz="2800" dirty="0" err="1"/>
-              <a:t>xox</a:t>
-            </a:r>
-            <a:r>
-              <a:rPr lang="pt-BR" sz="2800" dirty="0"/>
-              <a:t> </a:t>
-            </a:r>
-            <a:r>
-              <a:rPr lang="pt-BR" sz="2800" dirty="0" err="1"/>
-              <a:t>oxox</a:t>
-            </a:r>
-            <a:r>
-              <a:rPr lang="pt-BR" sz="2800" dirty="0"/>
-              <a:t> </a:t>
-            </a:r>
-            <a:r>
-              <a:rPr lang="pt-BR" sz="2800" dirty="0" err="1"/>
-              <a:t>ox</a:t>
-            </a:r>
-            <a:r>
-              <a:rPr lang="pt-BR" sz="2800" dirty="0"/>
-              <a:t> </a:t>
-            </a:r>
-            <a:r>
-              <a:rPr lang="pt-BR" sz="2800" dirty="0" err="1"/>
-              <a:t>ooxo</a:t>
-            </a:r>
-            <a:r>
-              <a:rPr lang="pt-BR" sz="2800" dirty="0"/>
-              <a:t> </a:t>
-            </a:r>
-            <a:r>
-              <a:rPr lang="pt-BR" sz="2800" dirty="0" err="1"/>
-              <a:t>xo</a:t>
-            </a:r>
-            <a:r>
-              <a:rPr lang="pt-BR" sz="2800" dirty="0"/>
-              <a:t> </a:t>
-            </a:r>
-            <a:r>
-              <a:rPr lang="pt-BR" sz="2800" dirty="0" err="1"/>
-              <a:t>ox</a:t>
-            </a:r>
-            <a:r>
-              <a:rPr lang="pt-BR" sz="2800" dirty="0"/>
-              <a:t> </a:t>
-            </a:r>
-            <a:r>
-              <a:rPr lang="pt-BR" sz="2800" dirty="0" err="1"/>
-              <a:t>Xoxooxx</a:t>
-            </a:r>
-            <a:r>
-              <a:rPr lang="pt-BR" sz="2800" dirty="0"/>
-              <a:t>  xoxo </a:t>
-            </a:r>
-            <a:r>
-              <a:rPr lang="pt-BR" sz="2800" dirty="0" err="1"/>
-              <a:t>xo</a:t>
-            </a:r>
-            <a:r>
-              <a:rPr lang="pt-BR" sz="2800" dirty="0"/>
-              <a:t> </a:t>
-            </a:r>
-            <a:r>
-              <a:rPr lang="pt-BR" sz="2800" dirty="0" err="1"/>
-              <a:t>xpxoxooxooxo</a:t>
-            </a:r>
-            <a:r>
-              <a:rPr lang="pt-BR" sz="2800" dirty="0"/>
-              <a:t>.</a:t>
-            </a:r>
-          </a:p>
-          <a:p>
-            <a:pPr algn="just"/>
-            <a:r>
-              <a:rPr lang="pt-BR" sz="2800" dirty="0" err="1"/>
-              <a:t>Xx</a:t>
-            </a:r>
-            <a:r>
-              <a:rPr lang="pt-BR" sz="2800" dirty="0"/>
-              <a:t> </a:t>
-            </a:r>
-            <a:r>
-              <a:rPr lang="pt-BR" sz="2800" dirty="0" err="1"/>
-              <a:t>oo</a:t>
-            </a:r>
-            <a:r>
-              <a:rPr lang="pt-BR" sz="2800" dirty="0"/>
-              <a:t> </a:t>
-            </a:r>
-            <a:r>
-              <a:rPr lang="pt-BR" sz="2800" dirty="0" err="1"/>
-              <a:t>xo</a:t>
-            </a:r>
-            <a:r>
-              <a:rPr lang="pt-BR" sz="2800" dirty="0"/>
-              <a:t> </a:t>
-            </a:r>
-            <a:r>
-              <a:rPr lang="pt-BR" sz="2800" dirty="0" err="1"/>
-              <a:t>ox</a:t>
-            </a:r>
-            <a:r>
-              <a:rPr lang="pt-BR" sz="2800" dirty="0"/>
-              <a:t> </a:t>
-            </a:r>
-            <a:r>
-              <a:rPr lang="pt-BR" sz="2800" dirty="0" err="1"/>
-              <a:t>ox</a:t>
-            </a:r>
-            <a:r>
-              <a:rPr lang="pt-BR" sz="2800" dirty="0"/>
-              <a:t> </a:t>
-            </a:r>
-            <a:r>
-              <a:rPr lang="pt-BR" sz="2800" dirty="0" err="1"/>
-              <a:t>ox</a:t>
-            </a:r>
-            <a:r>
-              <a:rPr lang="pt-BR" sz="2800" dirty="0"/>
-              <a:t> </a:t>
-            </a:r>
-            <a:r>
-              <a:rPr lang="pt-BR" sz="2800" dirty="0" err="1"/>
-              <a:t>ox</a:t>
-            </a:r>
-            <a:r>
-              <a:rPr lang="pt-BR" sz="2800" dirty="0"/>
-              <a:t> </a:t>
-            </a:r>
-            <a:r>
-              <a:rPr lang="pt-BR" sz="2800" dirty="0" err="1"/>
-              <a:t>ocooc</a:t>
-            </a:r>
-            <a:r>
-              <a:rPr lang="pt-BR" sz="2800" dirty="0"/>
-              <a:t> </a:t>
-            </a:r>
-            <a:r>
-              <a:rPr lang="pt-BR" sz="2800" dirty="0" err="1"/>
-              <a:t>Xoo</a:t>
-            </a:r>
-            <a:r>
-              <a:rPr lang="pt-BR" sz="2800" dirty="0"/>
-              <a:t> </a:t>
-            </a:r>
-            <a:r>
-              <a:rPr lang="pt-BR" sz="2800" dirty="0" err="1"/>
-              <a:t>xo</a:t>
-            </a:r>
-            <a:r>
-              <a:rPr lang="pt-BR" sz="2800" dirty="0"/>
-              <a:t> </a:t>
-            </a:r>
-            <a:r>
-              <a:rPr lang="pt-BR" sz="2800" dirty="0" err="1"/>
-              <a:t>xoxoxo</a:t>
-            </a:r>
-            <a:r>
-              <a:rPr lang="pt-BR" sz="2800" dirty="0"/>
-              <a:t> </a:t>
-            </a:r>
-            <a:r>
-              <a:rPr lang="pt-BR" sz="2800" dirty="0" err="1"/>
-              <a:t>xoxooxox</a:t>
-            </a:r>
-            <a:r>
-              <a:rPr lang="pt-BR" sz="2800" dirty="0"/>
-              <a:t> </a:t>
-            </a:r>
-            <a:r>
-              <a:rPr lang="pt-BR" sz="2800" dirty="0" err="1"/>
-              <a:t>xoxox</a:t>
-            </a:r>
-            <a:r>
-              <a:rPr lang="pt-BR" sz="2800" dirty="0"/>
-              <a:t> xoxo </a:t>
-            </a:r>
-            <a:r>
-              <a:rPr lang="pt-BR" sz="2800" dirty="0" err="1"/>
-              <a:t>xxxxxxxxxxxo</a:t>
-            </a:r>
-            <a:r>
-              <a:rPr lang="pt-BR" sz="2800" dirty="0"/>
-              <a:t> </a:t>
-            </a:r>
-            <a:r>
-              <a:rPr lang="pt-BR" sz="2800" dirty="0" err="1"/>
-              <a:t>xo</a:t>
-            </a:r>
-            <a:r>
-              <a:rPr lang="pt-BR" sz="2800" dirty="0"/>
-              <a:t> (</a:t>
-            </a:r>
-            <a:r>
-              <a:rPr lang="pt-BR" sz="2800" dirty="0" err="1"/>
-              <a:t>Petrucci</a:t>
-            </a:r>
-            <a:r>
-              <a:rPr lang="pt-BR" sz="2800" dirty="0"/>
-              <a:t>, 1995). </a:t>
-            </a:r>
-          </a:p>
-          <a:p>
-            <a:pPr algn="just"/>
-            <a:r>
-              <a:rPr lang="pt-BR" sz="2800" dirty="0" err="1"/>
-              <a:t>Xooxoxoxo</a:t>
-            </a:r>
-            <a:r>
-              <a:rPr lang="pt-BR" sz="2800" dirty="0"/>
-              <a:t> </a:t>
-            </a:r>
-            <a:r>
-              <a:rPr lang="pt-BR" sz="2800" dirty="0" err="1"/>
-              <a:t>xoxoo</a:t>
-            </a:r>
-            <a:r>
-              <a:rPr lang="pt-BR" sz="2800" dirty="0"/>
-              <a:t> </a:t>
-            </a:r>
-            <a:r>
-              <a:rPr lang="pt-BR" sz="2800" dirty="0" err="1"/>
-              <a:t>xoxoox</a:t>
-            </a:r>
-            <a:r>
-              <a:rPr lang="pt-BR" sz="2800" dirty="0"/>
-              <a:t> </a:t>
-            </a:r>
-            <a:r>
-              <a:rPr lang="pt-BR" sz="2800" dirty="0" err="1"/>
-              <a:t>x</a:t>
-            </a:r>
-            <a:r>
-              <a:rPr lang="pt-BR" sz="2800" dirty="0"/>
-              <a:t> </a:t>
-            </a:r>
-            <a:r>
-              <a:rPr lang="pt-BR" sz="2800" dirty="0" err="1"/>
-              <a:t>oxooxo</a:t>
-            </a:r>
-            <a:r>
-              <a:rPr lang="pt-BR" sz="2800" dirty="0"/>
-              <a:t> </a:t>
-            </a:r>
-            <a:r>
-              <a:rPr lang="pt-BR" sz="2800" dirty="0" err="1"/>
-              <a:t>xo</a:t>
-            </a:r>
-            <a:r>
-              <a:rPr lang="pt-BR" sz="2800" dirty="0"/>
-              <a:t> </a:t>
-            </a:r>
-            <a:r>
-              <a:rPr lang="pt-BR" sz="2800" dirty="0" err="1"/>
-              <a:t>xoox</a:t>
-            </a:r>
-            <a:r>
-              <a:rPr lang="pt-BR" sz="2800" dirty="0"/>
-              <a:t> </a:t>
-            </a:r>
-            <a:r>
-              <a:rPr lang="pt-BR" sz="2800" dirty="0" err="1"/>
-              <a:t>xoxoox</a:t>
-            </a:r>
-            <a:r>
-              <a:rPr lang="pt-BR" sz="2800" dirty="0"/>
-              <a:t> </a:t>
-            </a:r>
-            <a:r>
-              <a:rPr lang="pt-BR" sz="2800" dirty="0" err="1"/>
-              <a:t>xooxoxox</a:t>
-            </a:r>
-            <a:r>
-              <a:rPr lang="pt-BR" sz="2800" dirty="0"/>
-              <a:t> </a:t>
-            </a:r>
-            <a:r>
-              <a:rPr lang="pt-BR" sz="2800" dirty="0" err="1"/>
-              <a:t>ox</a:t>
-            </a:r>
-            <a:r>
-              <a:rPr lang="pt-BR" sz="2800" dirty="0"/>
-              <a:t> </a:t>
-            </a:r>
-            <a:r>
-              <a:rPr lang="pt-BR" sz="2800" dirty="0" err="1"/>
-              <a:t>xoxoox</a:t>
-            </a:r>
-            <a:r>
-              <a:rPr lang="pt-BR" sz="2800" dirty="0"/>
-              <a:t> </a:t>
-            </a:r>
-            <a:r>
-              <a:rPr lang="pt-BR" sz="2800" dirty="0" err="1"/>
-              <a:t>xoxooxo</a:t>
-            </a:r>
-            <a:r>
-              <a:rPr lang="pt-BR" sz="2800" dirty="0"/>
-              <a:t> </a:t>
-            </a:r>
-            <a:r>
-              <a:rPr lang="pt-BR" sz="2800" dirty="0" err="1"/>
-              <a:t>xox</a:t>
-            </a:r>
-            <a:r>
-              <a:rPr lang="pt-BR" sz="2800" dirty="0"/>
-              <a:t> </a:t>
-            </a:r>
-            <a:r>
-              <a:rPr lang="pt-BR" sz="2800" dirty="0" err="1"/>
-              <a:t>ooxo</a:t>
-            </a:r>
-            <a:r>
-              <a:rPr lang="pt-BR" sz="2800" dirty="0"/>
-              <a:t> </a:t>
-            </a:r>
-            <a:r>
-              <a:rPr lang="pt-BR" sz="2800" dirty="0" err="1"/>
-              <a:t>xooxoox</a:t>
-            </a:r>
-            <a:r>
-              <a:rPr lang="pt-BR" sz="2800" dirty="0"/>
-              <a:t> </a:t>
-            </a:r>
-            <a:r>
-              <a:rPr lang="pt-BR" sz="2800" dirty="0" err="1"/>
-              <a:t>xoxoxoo</a:t>
-            </a:r>
-            <a:r>
-              <a:rPr lang="pt-BR" sz="2800" dirty="0"/>
-              <a:t> </a:t>
-            </a:r>
-            <a:r>
-              <a:rPr lang="pt-BR" sz="2800" dirty="0" err="1"/>
-              <a:t>xox</a:t>
-            </a:r>
-            <a:r>
-              <a:rPr lang="pt-BR" sz="2800" dirty="0"/>
-              <a:t> </a:t>
-            </a:r>
-            <a:r>
-              <a:rPr lang="pt-BR" sz="2800" dirty="0" err="1"/>
-              <a:t>xoxoxoxo</a:t>
-            </a:r>
-            <a:r>
-              <a:rPr lang="pt-BR" sz="2800" dirty="0"/>
-              <a:t> </a:t>
-            </a:r>
-            <a:r>
-              <a:rPr lang="pt-BR" sz="2800" dirty="0" err="1"/>
-              <a:t>xo</a:t>
-            </a:r>
-            <a:r>
-              <a:rPr lang="pt-BR" sz="2800" dirty="0"/>
-              <a:t> </a:t>
-            </a:r>
-            <a:r>
-              <a:rPr lang="pt-BR" sz="2800" dirty="0" err="1"/>
-              <a:t>oxooxo</a:t>
-            </a:r>
-            <a:r>
-              <a:rPr lang="pt-BR" sz="2800" dirty="0"/>
-              <a:t> </a:t>
-            </a:r>
-            <a:r>
-              <a:rPr lang="pt-BR" sz="2800" dirty="0" err="1"/>
-              <a:t>xooxoxox</a:t>
-            </a:r>
-            <a:r>
-              <a:rPr lang="pt-BR" sz="2800" dirty="0"/>
-              <a:t> </a:t>
-            </a:r>
-            <a:r>
-              <a:rPr lang="pt-BR" sz="2800" dirty="0" err="1"/>
-              <a:t>oxooxoxo</a:t>
-            </a:r>
-            <a:r>
-              <a:rPr lang="pt-BR" sz="2800" dirty="0"/>
-              <a:t> </a:t>
-            </a:r>
-            <a:r>
-              <a:rPr lang="pt-BR" sz="2800" dirty="0" err="1"/>
-              <a:t>xxooxooxooxox</a:t>
-            </a:r>
-            <a:r>
-              <a:rPr lang="pt-BR" sz="2800" dirty="0"/>
-              <a:t> </a:t>
-            </a:r>
-            <a:r>
-              <a:rPr lang="pt-BR" sz="2800" dirty="0" err="1"/>
-              <a:t>xox</a:t>
-            </a:r>
-            <a:r>
-              <a:rPr lang="pt-BR" sz="2800" dirty="0"/>
-              <a:t> </a:t>
-            </a:r>
-            <a:r>
-              <a:rPr lang="pt-BR" sz="2800" dirty="0" err="1"/>
-              <a:t>ooox</a:t>
-            </a:r>
-            <a:r>
-              <a:rPr lang="pt-BR" sz="2800" dirty="0"/>
-              <a:t> </a:t>
-            </a:r>
-            <a:r>
-              <a:rPr lang="pt-BR" sz="2800" dirty="0" err="1"/>
-              <a:t>xoxoxoox</a:t>
-            </a:r>
-            <a:r>
-              <a:rPr lang="pt-BR" sz="2800" dirty="0"/>
-              <a:t> </a:t>
-            </a:r>
-            <a:r>
-              <a:rPr lang="pt-BR" sz="2800" dirty="0" err="1"/>
-              <a:t>xo</a:t>
-            </a:r>
-            <a:r>
-              <a:rPr lang="pt-BR" sz="2800" dirty="0"/>
-              <a:t> xoxo </a:t>
-            </a:r>
-            <a:r>
-              <a:rPr lang="pt-BR" sz="2800" dirty="0" err="1"/>
-              <a:t>xox</a:t>
-            </a:r>
-            <a:r>
-              <a:rPr lang="pt-BR" sz="2800" dirty="0"/>
-              <a:t> </a:t>
-            </a:r>
-            <a:r>
-              <a:rPr lang="pt-BR" sz="2800" dirty="0" err="1"/>
-              <a:t>oxox</a:t>
-            </a:r>
-            <a:r>
-              <a:rPr lang="pt-BR" sz="2800" dirty="0"/>
-              <a:t>  xoxo </a:t>
-            </a:r>
-            <a:r>
-              <a:rPr lang="pt-BR" sz="2800" dirty="0" err="1"/>
-              <a:t>oxo</a:t>
-            </a:r>
-            <a:r>
-              <a:rPr lang="pt-BR" sz="2800" dirty="0"/>
-              <a:t> </a:t>
-            </a:r>
-            <a:r>
-              <a:rPr lang="pt-BR" sz="2800" dirty="0" err="1"/>
-              <a:t>oxo</a:t>
-            </a:r>
-            <a:r>
-              <a:rPr lang="pt-BR" sz="2800" dirty="0"/>
-              <a:t> </a:t>
-            </a:r>
-            <a:r>
-              <a:rPr lang="pt-BR" sz="2800" dirty="0" err="1"/>
-              <a:t>xo</a:t>
-            </a:r>
-            <a:r>
-              <a:rPr lang="pt-BR" sz="2800" dirty="0"/>
-              <a:t>. </a:t>
-            </a:r>
-            <a:r>
-              <a:rPr lang="pt-BR" sz="2800" dirty="0" err="1"/>
-              <a:t>Xooxoxoxo</a:t>
-            </a:r>
-            <a:r>
-              <a:rPr lang="pt-BR" sz="2800" dirty="0"/>
-              <a:t> </a:t>
-            </a:r>
-            <a:r>
-              <a:rPr lang="pt-BR" sz="2800" dirty="0" err="1"/>
-              <a:t>xoxoo</a:t>
-            </a:r>
-            <a:r>
-              <a:rPr lang="pt-BR" sz="2800" dirty="0"/>
-              <a:t> </a:t>
-            </a:r>
-            <a:r>
-              <a:rPr lang="pt-BR" sz="2800" dirty="0" err="1"/>
-              <a:t>xoxoox</a:t>
-            </a:r>
-            <a:r>
-              <a:rPr lang="pt-BR" sz="2800" dirty="0"/>
-              <a:t> </a:t>
-            </a:r>
-            <a:r>
-              <a:rPr lang="pt-BR" sz="2800" dirty="0" err="1"/>
-              <a:t>x</a:t>
-            </a:r>
-            <a:r>
-              <a:rPr lang="pt-BR" sz="2800" dirty="0"/>
-              <a:t> </a:t>
-            </a:r>
-            <a:r>
-              <a:rPr lang="pt-BR" sz="2800" dirty="0" err="1"/>
-              <a:t>xxooxooxooxox</a:t>
-            </a:r>
-            <a:r>
-              <a:rPr lang="pt-BR" sz="2800" dirty="0"/>
-              <a:t> </a:t>
-            </a:r>
-            <a:r>
-              <a:rPr lang="pt-BR" sz="2800" dirty="0" err="1"/>
-              <a:t>xox</a:t>
-            </a:r>
-            <a:r>
-              <a:rPr lang="pt-BR" sz="2800" dirty="0"/>
-              <a:t> </a:t>
-            </a:r>
-            <a:r>
-              <a:rPr lang="pt-BR" sz="2800" dirty="0" err="1"/>
-              <a:t>ooox</a:t>
-            </a:r>
-            <a:r>
-              <a:rPr lang="pt-BR" sz="2800" dirty="0"/>
-              <a:t> </a:t>
-            </a:r>
-            <a:r>
-              <a:rPr lang="pt-BR" sz="2800" dirty="0" err="1"/>
-              <a:t>xoxoxoox</a:t>
-            </a:r>
-            <a:r>
-              <a:rPr lang="pt-BR" sz="2800" dirty="0"/>
-              <a:t> </a:t>
-            </a:r>
-            <a:r>
-              <a:rPr lang="pt-BR" sz="2800" dirty="0" err="1"/>
-              <a:t>xo</a:t>
-            </a:r>
-            <a:r>
-              <a:rPr lang="pt-BR" sz="2800" dirty="0"/>
-              <a:t> xoxo </a:t>
-            </a:r>
-            <a:r>
-              <a:rPr lang="pt-BR" sz="2800" dirty="0" err="1"/>
-              <a:t>xox</a:t>
-            </a:r>
-            <a:r>
-              <a:rPr lang="pt-BR" sz="2800" dirty="0"/>
-              <a:t> </a:t>
-            </a:r>
-            <a:r>
-              <a:rPr lang="pt-BR" sz="2800" dirty="0" err="1"/>
-              <a:t>oxox</a:t>
-            </a:r>
-            <a:r>
-              <a:rPr lang="pt-BR" sz="2800" dirty="0"/>
-              <a:t>  xoxo </a:t>
-            </a:r>
-            <a:r>
-              <a:rPr lang="pt-BR" sz="2800" dirty="0" err="1"/>
-              <a:t>oxo</a:t>
-            </a:r>
-            <a:r>
-              <a:rPr lang="pt-BR" sz="2800" dirty="0"/>
-              <a:t> </a:t>
-            </a:r>
-            <a:r>
-              <a:rPr lang="pt-BR" sz="2800" dirty="0" err="1"/>
-              <a:t>oxo</a:t>
-            </a:r>
-            <a:r>
-              <a:rPr lang="pt-BR" sz="2800" dirty="0"/>
-              <a:t> </a:t>
-            </a:r>
-            <a:r>
-              <a:rPr lang="pt-BR" sz="2800" dirty="0" err="1"/>
-              <a:t>xo</a:t>
-            </a:r>
-            <a:r>
-              <a:rPr lang="pt-BR" sz="2800" dirty="0"/>
-              <a:t> (Robertson, 1993). </a:t>
-            </a:r>
-          </a:p>
-          <a:p>
-            <a:pPr algn="just"/>
-            <a:r>
-              <a:rPr lang="pt-BR" sz="2800" dirty="0" err="1"/>
-              <a:t>Oxooxo</a:t>
-            </a:r>
-            <a:r>
-              <a:rPr lang="pt-BR" sz="2800" dirty="0"/>
-              <a:t> </a:t>
-            </a:r>
-            <a:r>
-              <a:rPr lang="pt-BR" sz="2800" dirty="0" err="1"/>
-              <a:t>xooxoxox</a:t>
-            </a:r>
-            <a:r>
-              <a:rPr lang="pt-BR" sz="2800" dirty="0"/>
-              <a:t> </a:t>
-            </a:r>
-            <a:r>
-              <a:rPr lang="pt-BR" sz="2800" dirty="0" err="1"/>
-              <a:t>oxooxoxo</a:t>
-            </a:r>
-            <a:r>
-              <a:rPr lang="pt-BR" sz="2800" dirty="0"/>
-              <a:t> </a:t>
-            </a:r>
-            <a:r>
-              <a:rPr lang="pt-BR" sz="2800" dirty="0" err="1"/>
-              <a:t>xxooxooxooxox</a:t>
-            </a:r>
-            <a:r>
-              <a:rPr lang="pt-BR" sz="2800" dirty="0"/>
-              <a:t> </a:t>
-            </a:r>
-            <a:r>
-              <a:rPr lang="pt-BR" sz="2800" dirty="0" err="1"/>
-              <a:t>xox</a:t>
-            </a:r>
-            <a:r>
-              <a:rPr lang="pt-BR" sz="2800" dirty="0"/>
-              <a:t> </a:t>
-            </a:r>
-            <a:r>
-              <a:rPr lang="pt-BR" sz="2800" dirty="0" err="1"/>
-              <a:t>ooox</a:t>
-            </a:r>
-            <a:r>
-              <a:rPr lang="pt-BR" sz="2800" dirty="0"/>
-              <a:t> </a:t>
-            </a:r>
-            <a:r>
-              <a:rPr lang="pt-BR" sz="2800" dirty="0" err="1"/>
-              <a:t>xoxoxoox</a:t>
-            </a:r>
-            <a:r>
-              <a:rPr lang="pt-BR" sz="2800" dirty="0"/>
-              <a:t> </a:t>
-            </a:r>
-            <a:r>
-              <a:rPr lang="pt-BR" sz="2800" dirty="0" err="1"/>
-              <a:t>xo</a:t>
-            </a:r>
-            <a:r>
-              <a:rPr lang="pt-BR" sz="2800" dirty="0"/>
-              <a:t> xoxo </a:t>
-            </a:r>
-            <a:r>
-              <a:rPr lang="pt-BR" sz="2800" dirty="0" err="1"/>
-              <a:t>xox</a:t>
-            </a:r>
-            <a:r>
-              <a:rPr lang="pt-BR" sz="2800" dirty="0"/>
-              <a:t> </a:t>
-            </a:r>
-            <a:r>
-              <a:rPr lang="pt-BR" sz="2800" dirty="0" err="1"/>
-              <a:t>oxox</a:t>
-            </a:r>
-            <a:r>
-              <a:rPr lang="pt-BR" sz="2800" dirty="0"/>
-              <a:t>  xoxo </a:t>
-            </a:r>
-            <a:r>
-              <a:rPr lang="pt-BR" sz="2800" dirty="0" err="1"/>
-              <a:t>oxo</a:t>
-            </a:r>
-            <a:r>
-              <a:rPr lang="pt-BR" sz="2800" dirty="0"/>
-              <a:t> </a:t>
-            </a:r>
-            <a:r>
-              <a:rPr lang="pt-BR" sz="2800" dirty="0" err="1"/>
-              <a:t>oxo</a:t>
-            </a:r>
-            <a:r>
-              <a:rPr lang="pt-BR" sz="2800" dirty="0"/>
-              <a:t> </a:t>
-            </a:r>
-            <a:r>
-              <a:rPr lang="pt-BR" sz="2800" dirty="0" err="1"/>
-              <a:t>xo</a:t>
-            </a:r>
-            <a:r>
-              <a:rPr lang="pt-BR" sz="2800" dirty="0"/>
-              <a:t>. </a:t>
-            </a:r>
-            <a:r>
-              <a:rPr lang="pt-BR" sz="2800" dirty="0" err="1"/>
-              <a:t>Xooxoxoxo</a:t>
-            </a:r>
-            <a:r>
-              <a:rPr lang="pt-BR" sz="2800" dirty="0"/>
-              <a:t> </a:t>
-            </a:r>
-            <a:r>
-              <a:rPr lang="pt-BR" sz="2800" dirty="0" err="1"/>
-              <a:t>xoxoo</a:t>
-            </a:r>
-            <a:r>
-              <a:rPr lang="pt-BR" sz="2800" dirty="0"/>
-              <a:t> </a:t>
-            </a:r>
-            <a:r>
-              <a:rPr lang="pt-BR" sz="2800" dirty="0" err="1"/>
-              <a:t>xoxoox</a:t>
-            </a:r>
-            <a:r>
-              <a:rPr lang="pt-BR" sz="2800" dirty="0"/>
-              <a:t>.</a:t>
-            </a:r>
-          </a:p>
-        </p:txBody>
-      </p:sp>
-      <p:sp>
-        <p:nvSpPr>
-          <p:cNvPr id="41" name="Round Diagonal Corner Rectangle 40"/>
-          <p:cNvSpPr/>
-          <p:nvPr/>
-        </p:nvSpPr>
-        <p:spPr>
-          <a:xfrm>
-            <a:off x="10676378" y="9044091"/>
-            <a:ext cx="5169603" cy="662937"/>
-          </a:xfrm>
-          <a:prstGeom prst="round2DiagRect">
-            <a:avLst/>
-          </a:prstGeom>
-          <a:solidFill>
-            <a:srgbClr val="2B713A">
-              <a:alpha val="64000"/>
-            </a:srgbClr>
-          </a:solidFill>
-          <a:ln>
-            <a:noFill/>
-          </a:ln>
-          <a:effectLst/>
-        </p:spPr>
-        <p:style>
-          <a:lnRef idx="1">
-            <a:schemeClr val="accent1"/>
-          </a:lnRef>
-          <a:fillRef idx="3">
-            <a:schemeClr val="accent1"/>
-          </a:fillRef>
-          <a:effectRef idx="2">
-            <a:schemeClr val="accent1"/>
-          </a:effectRef>
-          <a:fontRef idx="minor">
-            <a:schemeClr val="lt1"/>
-          </a:fontRef>
-        </p:style>
-        <p:txBody>
-          <a:bodyPr lIns="258830" tIns="129415" rIns="258830" bIns="129415" rtlCol="0" anchor="ctr"/>
-          <a:lstStyle/>
-          <a:p>
-            <a:pPr algn="ctr"/>
-            <a:endParaRPr lang="en-US" dirty="0"/>
+            <a:endParaRPr lang="pt-BR" sz="2800" dirty="0"/>
           </a:p>
         </p:txBody>
       </p:sp>
@@ -6274,8 +4283,8 @@
         </p:nvSpPr>
         <p:spPr>
           <a:xfrm>
-            <a:off x="11172030" y="9048537"/>
-            <a:ext cx="9538785" cy="4647426"/>
+            <a:off x="11210394" y="9735320"/>
+            <a:ext cx="9538785" cy="677108"/>
           </a:xfrm>
           <a:prstGeom prst="rect">
             <a:avLst/>
@@ -6289,13 +4298,6 @@
           <a:lstStyle/>
           <a:p>
             <a:pPr algn="just"/>
-            <a:r>
-              <a:rPr lang="pt-BR" sz="3400" b="1" dirty="0"/>
-              <a:t>3 – Resultados</a:t>
-            </a:r>
-          </a:p>
-          <a:p>
-            <a:pPr algn="just"/>
             <a:endParaRPr lang="pt-BR" sz="1000" b="1" dirty="0"/>
           </a:p>
           <a:p>
@@ -6304,635 +4306,7 @@
               <a:rPr lang="pt-BR" sz="2800" dirty="0" err="1"/>
               <a:t>Xoxoox</a:t>
             </a:r>
-            <a:r>
-              <a:rPr lang="pt-BR" sz="2800" dirty="0"/>
-              <a:t> </a:t>
-            </a:r>
-            <a:r>
-              <a:rPr lang="pt-BR" sz="2800" dirty="0" err="1"/>
-              <a:t>ox</a:t>
-            </a:r>
-            <a:r>
-              <a:rPr lang="pt-BR" sz="2800" dirty="0"/>
-              <a:t> </a:t>
-            </a:r>
-            <a:r>
-              <a:rPr lang="pt-BR" sz="2800" dirty="0" err="1"/>
-              <a:t>oox</a:t>
-            </a:r>
-            <a:r>
-              <a:rPr lang="pt-BR" sz="2800" dirty="0"/>
-              <a:t> </a:t>
-            </a:r>
-            <a:r>
-              <a:rPr lang="pt-BR" sz="2800" dirty="0" err="1"/>
-              <a:t>xoooxoox</a:t>
-            </a:r>
-            <a:r>
-              <a:rPr lang="pt-BR" sz="2800" dirty="0"/>
-              <a:t> </a:t>
-            </a:r>
-            <a:r>
-              <a:rPr lang="pt-BR" sz="2800" dirty="0" err="1"/>
-              <a:t>ox</a:t>
-            </a:r>
-            <a:r>
-              <a:rPr lang="pt-BR" sz="2800" dirty="0"/>
-              <a:t> </a:t>
-            </a:r>
-            <a:r>
-              <a:rPr lang="pt-BR" sz="2800" dirty="0" err="1"/>
-              <a:t>oxo</a:t>
-            </a:r>
-            <a:r>
-              <a:rPr lang="pt-BR" sz="2800" dirty="0"/>
-              <a:t> </a:t>
-            </a:r>
-            <a:r>
-              <a:rPr lang="pt-BR" sz="2800" dirty="0" err="1"/>
-              <a:t>ox</a:t>
-            </a:r>
-            <a:r>
-              <a:rPr lang="pt-BR" sz="2800" dirty="0"/>
-              <a:t> </a:t>
-            </a:r>
-            <a:r>
-              <a:rPr lang="pt-BR" sz="2800" dirty="0" err="1"/>
-              <a:t>ox</a:t>
-            </a:r>
-            <a:r>
-              <a:rPr lang="pt-BR" sz="2800" dirty="0"/>
-              <a:t> </a:t>
-            </a:r>
-            <a:r>
-              <a:rPr lang="pt-BR" sz="2800" dirty="0" err="1"/>
-              <a:t>oxo</a:t>
-            </a:r>
-            <a:r>
-              <a:rPr lang="pt-BR" sz="2800" dirty="0"/>
-              <a:t> </a:t>
-            </a:r>
-            <a:r>
-              <a:rPr lang="pt-BR" sz="2800" dirty="0" err="1"/>
-              <a:t>oxoox</a:t>
-            </a:r>
-            <a:r>
-              <a:rPr lang="pt-BR" sz="2800" dirty="0"/>
-              <a:t> </a:t>
-            </a:r>
-            <a:r>
-              <a:rPr lang="pt-BR" sz="2800" dirty="0" err="1"/>
-              <a:t>xo</a:t>
-            </a:r>
-            <a:r>
-              <a:rPr lang="pt-BR" sz="2800" dirty="0"/>
-              <a:t> </a:t>
-            </a:r>
-            <a:r>
-              <a:rPr lang="pt-BR" sz="2800" dirty="0" err="1"/>
-              <a:t>oox</a:t>
-            </a:r>
-            <a:r>
-              <a:rPr lang="pt-BR" sz="2800" dirty="0"/>
-              <a:t> </a:t>
-            </a:r>
-            <a:r>
-              <a:rPr lang="pt-BR" sz="2800" dirty="0" err="1"/>
-              <a:t>oxoxo</a:t>
-            </a:r>
-            <a:r>
-              <a:rPr lang="pt-BR" sz="2800" dirty="0"/>
-              <a:t> </a:t>
-            </a:r>
-            <a:r>
-              <a:rPr lang="pt-BR" sz="2800" dirty="0" err="1"/>
-              <a:t>xoxooxoxooxo</a:t>
-            </a:r>
-            <a:r>
-              <a:rPr lang="pt-BR" sz="2800" dirty="0"/>
-              <a:t> </a:t>
-            </a:r>
-            <a:r>
-              <a:rPr lang="pt-BR" sz="2800" dirty="0" err="1"/>
-              <a:t>xoo</a:t>
-            </a:r>
-            <a:r>
-              <a:rPr lang="pt-BR" sz="2800" dirty="0"/>
-              <a:t> </a:t>
-            </a:r>
-            <a:r>
-              <a:rPr lang="pt-BR" sz="2800" dirty="0" err="1"/>
-              <a:t>xox</a:t>
-            </a:r>
-            <a:r>
-              <a:rPr lang="pt-BR" sz="2800" dirty="0"/>
-              <a:t> </a:t>
-            </a:r>
-            <a:r>
-              <a:rPr lang="pt-BR" sz="2800" dirty="0" err="1"/>
-              <a:t>oxox</a:t>
-            </a:r>
-            <a:r>
-              <a:rPr lang="pt-BR" sz="2800" dirty="0"/>
-              <a:t> </a:t>
-            </a:r>
-            <a:r>
-              <a:rPr lang="pt-BR" sz="2800" dirty="0" err="1"/>
-              <a:t>ox</a:t>
-            </a:r>
-            <a:r>
-              <a:rPr lang="pt-BR" sz="2800" dirty="0"/>
-              <a:t> </a:t>
-            </a:r>
-            <a:r>
-              <a:rPr lang="pt-BR" sz="2800" dirty="0" err="1"/>
-              <a:t>ooxo</a:t>
-            </a:r>
-            <a:r>
-              <a:rPr lang="pt-BR" sz="2800" dirty="0"/>
-              <a:t> </a:t>
-            </a:r>
-            <a:r>
-              <a:rPr lang="pt-BR" sz="2800" dirty="0" err="1"/>
-              <a:t>xo</a:t>
-            </a:r>
-            <a:r>
-              <a:rPr lang="pt-BR" sz="2800" dirty="0"/>
-              <a:t> </a:t>
-            </a:r>
-            <a:r>
-              <a:rPr lang="pt-BR" sz="2800" dirty="0" err="1"/>
-              <a:t>ox</a:t>
-            </a:r>
-            <a:r>
-              <a:rPr lang="pt-BR" sz="2800" dirty="0"/>
-              <a:t> </a:t>
-            </a:r>
-            <a:r>
-              <a:rPr lang="pt-BR" sz="2800" dirty="0" err="1"/>
-              <a:t>ox</a:t>
-            </a:r>
-            <a:r>
-              <a:rPr lang="pt-BR" sz="2800" dirty="0"/>
-              <a:t> </a:t>
-            </a:r>
-            <a:r>
-              <a:rPr lang="pt-BR" sz="2800" dirty="0" err="1"/>
-              <a:t>oo</a:t>
-            </a:r>
-            <a:r>
-              <a:rPr lang="pt-BR" sz="2800" dirty="0"/>
-              <a:t> </a:t>
-            </a:r>
-            <a:r>
-              <a:rPr lang="pt-BR" sz="2800" dirty="0" err="1"/>
-              <a:t>xo</a:t>
-            </a:r>
-            <a:r>
-              <a:rPr lang="pt-BR" sz="2800" dirty="0"/>
-              <a:t> </a:t>
-            </a:r>
-            <a:r>
-              <a:rPr lang="pt-BR" sz="2800" dirty="0" err="1"/>
-              <a:t>ox</a:t>
-            </a:r>
-            <a:r>
-              <a:rPr lang="pt-BR" sz="2800" dirty="0"/>
-              <a:t> </a:t>
-            </a:r>
-            <a:r>
-              <a:rPr lang="pt-BR" sz="2800" dirty="0" err="1"/>
-              <a:t>ox</a:t>
-            </a:r>
-            <a:r>
-              <a:rPr lang="pt-BR" sz="2800" dirty="0"/>
-              <a:t> </a:t>
-            </a:r>
-            <a:r>
-              <a:rPr lang="pt-BR" sz="2800" dirty="0" err="1"/>
-              <a:t>ox</a:t>
-            </a:r>
-            <a:r>
-              <a:rPr lang="pt-BR" sz="2800" dirty="0"/>
-              <a:t> </a:t>
-            </a:r>
-            <a:r>
-              <a:rPr lang="pt-BR" sz="2800" dirty="0" err="1"/>
-              <a:t>ox</a:t>
-            </a:r>
-            <a:r>
-              <a:rPr lang="pt-BR" sz="2800" dirty="0"/>
-              <a:t>. </a:t>
-            </a:r>
-          </a:p>
-          <a:p>
-            <a:pPr lvl="0" algn="just"/>
-            <a:r>
-              <a:rPr lang="pt-BR" sz="2800" dirty="0" err="1"/>
-              <a:t>Xxoox</a:t>
-            </a:r>
-            <a:r>
-              <a:rPr lang="pt-BR" sz="2800" dirty="0"/>
-              <a:t> </a:t>
-            </a:r>
-            <a:r>
-              <a:rPr lang="pt-BR" sz="2800" dirty="0" err="1"/>
-              <a:t>xo</a:t>
-            </a:r>
-            <a:r>
-              <a:rPr lang="pt-BR" sz="2800" dirty="0"/>
-              <a:t> </a:t>
-            </a:r>
-            <a:r>
-              <a:rPr lang="pt-BR" sz="2800" dirty="0" err="1"/>
-              <a:t>oox</a:t>
-            </a:r>
-            <a:r>
-              <a:rPr lang="pt-BR" sz="2800" dirty="0"/>
-              <a:t> </a:t>
-            </a:r>
-            <a:r>
-              <a:rPr lang="pt-BR" sz="2800" dirty="0" err="1"/>
-              <a:t>oxoxo</a:t>
-            </a:r>
-            <a:r>
-              <a:rPr lang="pt-BR" sz="2800" dirty="0"/>
-              <a:t> </a:t>
-            </a:r>
-            <a:r>
-              <a:rPr lang="pt-BR" sz="2800" dirty="0" err="1"/>
-              <a:t>xoxooxoxooxo</a:t>
-            </a:r>
-            <a:r>
-              <a:rPr lang="pt-BR" sz="2800" dirty="0"/>
-              <a:t> </a:t>
-            </a:r>
-            <a:r>
-              <a:rPr lang="pt-BR" sz="2800" dirty="0" err="1"/>
-              <a:t>xoo</a:t>
-            </a:r>
-            <a:r>
-              <a:rPr lang="pt-BR" sz="2800" dirty="0"/>
-              <a:t> </a:t>
-            </a:r>
-            <a:r>
-              <a:rPr lang="pt-BR" sz="2800" dirty="0" err="1"/>
-              <a:t>xox</a:t>
-            </a:r>
-            <a:r>
-              <a:rPr lang="pt-BR" sz="2800" dirty="0"/>
-              <a:t> </a:t>
-            </a:r>
-            <a:r>
-              <a:rPr lang="pt-BR" sz="2800" dirty="0" err="1"/>
-              <a:t>oxox</a:t>
-            </a:r>
-            <a:r>
-              <a:rPr lang="pt-BR" sz="2800" dirty="0"/>
-              <a:t> </a:t>
-            </a:r>
-            <a:r>
-              <a:rPr lang="pt-BR" sz="2800" dirty="0" err="1"/>
-              <a:t>ox</a:t>
-            </a:r>
-            <a:r>
-              <a:rPr lang="pt-BR" sz="2800" dirty="0"/>
-              <a:t> </a:t>
-            </a:r>
-            <a:r>
-              <a:rPr lang="pt-BR" sz="2800" dirty="0" err="1"/>
-              <a:t>ooxo</a:t>
-            </a:r>
-            <a:r>
-              <a:rPr lang="pt-BR" sz="2800" dirty="0"/>
-              <a:t> </a:t>
-            </a:r>
-            <a:r>
-              <a:rPr lang="pt-BR" sz="2800" dirty="0" err="1"/>
-              <a:t>xo</a:t>
-            </a:r>
-            <a:r>
-              <a:rPr lang="pt-BR" sz="2800" dirty="0"/>
-              <a:t> </a:t>
-            </a:r>
-            <a:r>
-              <a:rPr lang="pt-BR" sz="2800" dirty="0" err="1"/>
-              <a:t>ox</a:t>
-            </a:r>
-            <a:r>
-              <a:rPr lang="pt-BR" sz="2800" dirty="0"/>
-              <a:t> </a:t>
-            </a:r>
-            <a:r>
-              <a:rPr lang="pt-BR" sz="2800" dirty="0" err="1"/>
-              <a:t>Xoxooxx</a:t>
-            </a:r>
-            <a:r>
-              <a:rPr lang="pt-BR" sz="2800" dirty="0"/>
-              <a:t>  xoxo </a:t>
-            </a:r>
-            <a:r>
-              <a:rPr lang="pt-BR" sz="2800" dirty="0" err="1"/>
-              <a:t>xo</a:t>
-            </a:r>
-            <a:r>
-              <a:rPr lang="pt-BR" sz="2800" dirty="0"/>
-              <a:t> </a:t>
-            </a:r>
-            <a:r>
-              <a:rPr lang="pt-BR" sz="2800" dirty="0" err="1"/>
-              <a:t>xpxoxooxooxo</a:t>
-            </a:r>
-            <a:r>
-              <a:rPr lang="pt-BR" sz="2800" dirty="0"/>
-              <a:t>.</a:t>
-            </a:r>
-          </a:p>
-          <a:p>
-            <a:pPr lvl="0" algn="just"/>
-            <a:r>
-              <a:rPr lang="pt-BR" sz="2800" dirty="0" err="1"/>
-              <a:t>Xx</a:t>
-            </a:r>
-            <a:r>
-              <a:rPr lang="pt-BR" sz="2800" dirty="0"/>
-              <a:t> </a:t>
-            </a:r>
-            <a:r>
-              <a:rPr lang="pt-BR" sz="2800" dirty="0" err="1"/>
-              <a:t>oo</a:t>
-            </a:r>
-            <a:r>
-              <a:rPr lang="pt-BR" sz="2800" dirty="0"/>
-              <a:t> </a:t>
-            </a:r>
-            <a:r>
-              <a:rPr lang="pt-BR" sz="2800" dirty="0" err="1"/>
-              <a:t>Xoooo</a:t>
-            </a:r>
-            <a:r>
-              <a:rPr lang="pt-BR" sz="2800" dirty="0"/>
-              <a:t> </a:t>
-            </a:r>
-            <a:r>
-              <a:rPr lang="pt-BR" sz="2800" dirty="0" err="1"/>
-              <a:t>ox</a:t>
-            </a:r>
-            <a:r>
-              <a:rPr lang="pt-BR" sz="2800" dirty="0"/>
-              <a:t> </a:t>
-            </a:r>
-            <a:r>
-              <a:rPr lang="pt-BR" sz="2800" dirty="0" err="1"/>
-              <a:t>ox</a:t>
-            </a:r>
-            <a:r>
-              <a:rPr lang="pt-BR" sz="2800" dirty="0"/>
-              <a:t> </a:t>
-            </a:r>
-            <a:r>
-              <a:rPr lang="pt-BR" sz="2800" dirty="0" err="1"/>
-              <a:t>ox</a:t>
-            </a:r>
-            <a:r>
-              <a:rPr lang="pt-BR" sz="2800" dirty="0"/>
-              <a:t> </a:t>
-            </a:r>
-            <a:r>
-              <a:rPr lang="pt-BR" sz="2800" dirty="0" err="1"/>
-              <a:t>ox</a:t>
-            </a:r>
-            <a:r>
-              <a:rPr lang="pt-BR" sz="2800" dirty="0"/>
-              <a:t> </a:t>
-            </a:r>
-            <a:r>
-              <a:rPr lang="pt-BR" sz="2800" dirty="0" err="1"/>
-              <a:t>oxoox</a:t>
-            </a:r>
-            <a:r>
-              <a:rPr lang="pt-BR" sz="2800" dirty="0"/>
-              <a:t> </a:t>
-            </a:r>
-            <a:r>
-              <a:rPr lang="pt-BR" sz="2800" dirty="0" err="1"/>
-              <a:t>Xoo</a:t>
-            </a:r>
-            <a:r>
-              <a:rPr lang="pt-BR" sz="2800" dirty="0"/>
-              <a:t> </a:t>
-            </a:r>
-            <a:r>
-              <a:rPr lang="pt-BR" sz="2800" dirty="0" err="1"/>
-              <a:t>xo</a:t>
-            </a:r>
-            <a:r>
-              <a:rPr lang="pt-BR" sz="2800" dirty="0"/>
-              <a:t> </a:t>
-            </a:r>
-            <a:r>
-              <a:rPr lang="pt-BR" sz="2800" dirty="0" err="1"/>
-              <a:t>xoxoxo</a:t>
-            </a:r>
-            <a:r>
-              <a:rPr lang="pt-BR" sz="2800" dirty="0"/>
-              <a:t> </a:t>
-            </a:r>
-            <a:r>
-              <a:rPr lang="pt-BR" sz="2800" dirty="0" err="1"/>
-              <a:t>xoxooxox</a:t>
-            </a:r>
-            <a:r>
-              <a:rPr lang="pt-BR" sz="2800" dirty="0"/>
-              <a:t> </a:t>
-            </a:r>
-            <a:r>
-              <a:rPr lang="pt-BR" sz="2800" dirty="0" err="1"/>
-              <a:t>xoxox</a:t>
-            </a:r>
-            <a:r>
-              <a:rPr lang="pt-BR" sz="2800" dirty="0"/>
-              <a:t> xoxo </a:t>
-            </a:r>
-            <a:r>
-              <a:rPr lang="pt-BR" sz="2800" dirty="0" err="1"/>
-              <a:t>xxxxxxxxxxxo</a:t>
-            </a:r>
-            <a:r>
-              <a:rPr lang="pt-BR" sz="2800" dirty="0"/>
-              <a:t> </a:t>
-            </a:r>
-            <a:r>
-              <a:rPr lang="pt-BR" sz="2800" dirty="0" err="1"/>
-              <a:t>xo</a:t>
-            </a:r>
-            <a:r>
-              <a:rPr lang="pt-BR" sz="2800" dirty="0"/>
-              <a:t>.</a:t>
-            </a:r>
-          </a:p>
-          <a:p>
-            <a:pPr lvl="0" algn="just"/>
-            <a:r>
-              <a:rPr lang="pt-BR" sz="2800" dirty="0" err="1"/>
-              <a:t>Xxoox</a:t>
-            </a:r>
-            <a:r>
-              <a:rPr lang="pt-BR" sz="2800" dirty="0"/>
-              <a:t> </a:t>
-            </a:r>
-            <a:r>
-              <a:rPr lang="pt-BR" sz="2800" dirty="0" err="1"/>
-              <a:t>xo</a:t>
-            </a:r>
-            <a:r>
-              <a:rPr lang="pt-BR" sz="2800" dirty="0"/>
-              <a:t> </a:t>
-            </a:r>
-            <a:r>
-              <a:rPr lang="pt-BR" sz="2800" dirty="0" err="1"/>
-              <a:t>oox</a:t>
-            </a:r>
-            <a:r>
-              <a:rPr lang="pt-BR" sz="2800" dirty="0"/>
-              <a:t> </a:t>
-            </a:r>
-            <a:r>
-              <a:rPr lang="pt-BR" sz="2800" dirty="0" err="1"/>
-              <a:t>oxoxo</a:t>
-            </a:r>
-            <a:r>
-              <a:rPr lang="pt-BR" sz="2800" dirty="0"/>
-              <a:t> </a:t>
-            </a:r>
-            <a:r>
-              <a:rPr lang="pt-BR" sz="2800" dirty="0" err="1"/>
-              <a:t>xoxooxoxoxox</a:t>
-            </a:r>
-            <a:r>
-              <a:rPr lang="pt-BR" sz="2800" dirty="0"/>
-              <a:t> </a:t>
-            </a:r>
-            <a:r>
-              <a:rPr lang="pt-BR" sz="2800" dirty="0" err="1"/>
-              <a:t>xoxoxoxo</a:t>
-            </a:r>
-            <a:r>
-              <a:rPr lang="pt-BR" sz="2800" dirty="0"/>
-              <a:t> </a:t>
-            </a:r>
-            <a:r>
-              <a:rPr lang="pt-BR" sz="2800" dirty="0" err="1"/>
-              <a:t>xoxoxoxo</a:t>
-            </a:r>
-            <a:r>
-              <a:rPr lang="pt-BR" sz="2800" dirty="0"/>
-              <a:t> </a:t>
-            </a:r>
-            <a:r>
-              <a:rPr lang="pt-BR" sz="2800" dirty="0" err="1"/>
-              <a:t>xoxoxoxoxoxo</a:t>
-            </a:r>
-            <a:r>
-              <a:rPr lang="pt-BR" sz="2800" dirty="0"/>
-              <a:t> </a:t>
-            </a:r>
-            <a:r>
-              <a:rPr lang="pt-BR" sz="2800" dirty="0" err="1"/>
-              <a:t>xoxox</a:t>
-            </a:r>
-            <a:r>
-              <a:rPr lang="pt-BR" sz="2800" dirty="0"/>
-              <a:t> </a:t>
-            </a:r>
-            <a:r>
-              <a:rPr lang="pt-BR" sz="2800" dirty="0" err="1"/>
-              <a:t>xoxooxo</a:t>
-            </a:r>
-            <a:r>
-              <a:rPr lang="pt-BR" sz="2800" dirty="0"/>
-              <a:t> </a:t>
-            </a:r>
-            <a:r>
-              <a:rPr lang="pt-BR" sz="2800" dirty="0" err="1"/>
-              <a:t>xoo</a:t>
-            </a:r>
-            <a:r>
-              <a:rPr lang="pt-BR" sz="2800" dirty="0"/>
-              <a:t> </a:t>
-            </a:r>
-            <a:r>
-              <a:rPr lang="pt-BR" sz="2800" dirty="0" err="1"/>
-              <a:t>xox</a:t>
-            </a:r>
-            <a:r>
-              <a:rPr lang="pt-BR" sz="2800" dirty="0"/>
-              <a:t> </a:t>
-            </a:r>
-            <a:r>
-              <a:rPr lang="pt-BR" sz="2800" dirty="0" err="1"/>
-              <a:t>oxox</a:t>
-            </a:r>
-            <a:r>
-              <a:rPr lang="pt-BR" sz="2800" dirty="0"/>
-              <a:t> </a:t>
-            </a:r>
-            <a:r>
-              <a:rPr lang="pt-BR" sz="2800" dirty="0" err="1"/>
-              <a:t>ox</a:t>
-            </a:r>
-            <a:r>
-              <a:rPr lang="pt-BR" sz="2800" dirty="0"/>
-              <a:t> </a:t>
-            </a:r>
-            <a:r>
-              <a:rPr lang="pt-BR" sz="2800" dirty="0" err="1"/>
-              <a:t>ooxo</a:t>
-            </a:r>
-            <a:r>
-              <a:rPr lang="pt-BR" sz="2800" dirty="0"/>
-              <a:t> </a:t>
-            </a:r>
-            <a:r>
-              <a:rPr lang="pt-BR" sz="2800" dirty="0" err="1"/>
-              <a:t>xo</a:t>
-            </a:r>
-            <a:r>
-              <a:rPr lang="pt-BR" sz="2800" dirty="0"/>
-              <a:t> </a:t>
-            </a:r>
-            <a:r>
-              <a:rPr lang="pt-BR" sz="2800" dirty="0" err="1"/>
-              <a:t>ox</a:t>
-            </a:r>
-            <a:r>
-              <a:rPr lang="pt-BR" sz="2800" dirty="0"/>
-              <a:t> </a:t>
-            </a:r>
-            <a:r>
-              <a:rPr lang="pt-BR" sz="2800" dirty="0" err="1"/>
-              <a:t>Xoxooxx</a:t>
-            </a:r>
-            <a:r>
-              <a:rPr lang="pt-BR" sz="2800" dirty="0"/>
-              <a:t>  xoxo </a:t>
-            </a:r>
-            <a:r>
-              <a:rPr lang="pt-BR" sz="2800" dirty="0" err="1"/>
-              <a:t>xo</a:t>
-            </a:r>
-            <a:r>
-              <a:rPr lang="pt-BR" sz="2800" dirty="0"/>
-              <a:t> </a:t>
-            </a:r>
-            <a:r>
-              <a:rPr lang="pt-BR" sz="2800" dirty="0" err="1"/>
-              <a:t>xpxoxooxooxo</a:t>
-            </a:r>
-            <a:r>
-              <a:rPr lang="pt-BR" sz="2800" dirty="0"/>
-              <a:t>. </a:t>
-            </a:r>
+            <a:endParaRPr lang="pt-BR" sz="2800" dirty="0"/>
           </a:p>
         </p:txBody>
       </p:sp>
@@ -6945,7 +4319,7 @@
         <p:spPr>
           <a:xfrm>
             <a:off x="11234929" y="17979012"/>
-            <a:ext cx="9538785" cy="4647426"/>
+            <a:ext cx="9538785" cy="1200329"/>
           </a:xfrm>
           <a:prstGeom prst="rect">
             <a:avLst/>
@@ -6961,7 +4335,7 @@
             <a:pPr algn="just"/>
             <a:r>
               <a:rPr lang="pt-BR" sz="3400" b="1" dirty="0"/>
-              <a:t>4 – Conclusão</a:t>
+              <a:t>3 – Conclusão</a:t>
             </a:r>
           </a:p>
           <a:p>
@@ -6974,766 +4348,7 @@
               <a:rPr lang="pt-BR" sz="2800" dirty="0" err="1"/>
               <a:t>Xoxoox</a:t>
             </a:r>
-            <a:r>
-              <a:rPr lang="pt-BR" sz="2800" dirty="0"/>
-              <a:t> </a:t>
-            </a:r>
-            <a:r>
-              <a:rPr lang="pt-BR" sz="2800" dirty="0" err="1"/>
-              <a:t>ox</a:t>
-            </a:r>
-            <a:r>
-              <a:rPr lang="pt-BR" sz="2800" dirty="0"/>
-              <a:t> </a:t>
-            </a:r>
-            <a:r>
-              <a:rPr lang="pt-BR" sz="2800" dirty="0" err="1"/>
-              <a:t>oox</a:t>
-            </a:r>
-            <a:r>
-              <a:rPr lang="pt-BR" sz="2800" dirty="0"/>
-              <a:t> </a:t>
-            </a:r>
-            <a:r>
-              <a:rPr lang="pt-BR" sz="2800" dirty="0" err="1"/>
-              <a:t>xoooxoox</a:t>
-            </a:r>
-            <a:r>
-              <a:rPr lang="pt-BR" sz="2800" dirty="0"/>
-              <a:t> </a:t>
-            </a:r>
-            <a:r>
-              <a:rPr lang="pt-BR" sz="2800" dirty="0" err="1"/>
-              <a:t>ox</a:t>
-            </a:r>
-            <a:r>
-              <a:rPr lang="pt-BR" sz="2800" dirty="0"/>
-              <a:t> </a:t>
-            </a:r>
-            <a:r>
-              <a:rPr lang="pt-BR" sz="2800" dirty="0" err="1"/>
-              <a:t>oxo</a:t>
-            </a:r>
-            <a:r>
-              <a:rPr lang="pt-BR" sz="2800" dirty="0"/>
-              <a:t> </a:t>
-            </a:r>
-            <a:r>
-              <a:rPr lang="pt-BR" sz="2800" dirty="0" err="1"/>
-              <a:t>ox</a:t>
-            </a:r>
-            <a:r>
-              <a:rPr lang="pt-BR" sz="2800" dirty="0"/>
-              <a:t> </a:t>
-            </a:r>
-            <a:r>
-              <a:rPr lang="pt-BR" sz="2800" dirty="0" err="1"/>
-              <a:t>ox</a:t>
-            </a:r>
-            <a:r>
-              <a:rPr lang="pt-BR" sz="2800" dirty="0"/>
-              <a:t> </a:t>
-            </a:r>
-            <a:r>
-              <a:rPr lang="pt-BR" sz="2800" dirty="0" err="1"/>
-              <a:t>oxo</a:t>
-            </a:r>
-            <a:r>
-              <a:rPr lang="pt-BR" sz="2800" dirty="0"/>
-              <a:t> </a:t>
-            </a:r>
-            <a:r>
-              <a:rPr lang="pt-BR" sz="2800" dirty="0" err="1"/>
-              <a:t>oxoox</a:t>
-            </a:r>
-            <a:r>
-              <a:rPr lang="pt-BR" sz="2800" dirty="0"/>
-              <a:t> </a:t>
-            </a:r>
-            <a:r>
-              <a:rPr lang="pt-BR" sz="2800" dirty="0" err="1"/>
-              <a:t>xo</a:t>
-            </a:r>
-            <a:r>
-              <a:rPr lang="pt-BR" sz="2800" dirty="0"/>
-              <a:t> </a:t>
-            </a:r>
-            <a:r>
-              <a:rPr lang="pt-BR" sz="2800" dirty="0" err="1"/>
-              <a:t>oox</a:t>
-            </a:r>
-            <a:r>
-              <a:rPr lang="pt-BR" sz="2800" dirty="0"/>
-              <a:t> </a:t>
-            </a:r>
-            <a:r>
-              <a:rPr lang="pt-BR" sz="2800" dirty="0" err="1"/>
-              <a:t>oxoxo</a:t>
-            </a:r>
-            <a:r>
-              <a:rPr lang="pt-BR" sz="2800" dirty="0"/>
-              <a:t> </a:t>
-            </a:r>
-            <a:r>
-              <a:rPr lang="pt-BR" sz="2800" dirty="0" err="1"/>
-              <a:t>xoxooxoxooxo</a:t>
-            </a:r>
-            <a:r>
-              <a:rPr lang="pt-BR" sz="2800" dirty="0"/>
-              <a:t> </a:t>
-            </a:r>
-            <a:r>
-              <a:rPr lang="pt-BR" sz="2800" dirty="0" err="1"/>
-              <a:t>xoo</a:t>
-            </a:r>
-            <a:r>
-              <a:rPr lang="pt-BR" sz="2800" dirty="0"/>
-              <a:t> </a:t>
-            </a:r>
-            <a:r>
-              <a:rPr lang="pt-BR" sz="2800" dirty="0" err="1"/>
-              <a:t>xox</a:t>
-            </a:r>
-            <a:r>
-              <a:rPr lang="pt-BR" sz="2800" dirty="0"/>
-              <a:t> </a:t>
-            </a:r>
-            <a:r>
-              <a:rPr lang="pt-BR" sz="2800" dirty="0" err="1"/>
-              <a:t>oxox</a:t>
-            </a:r>
-            <a:r>
-              <a:rPr lang="pt-BR" sz="2800" dirty="0"/>
-              <a:t> </a:t>
-            </a:r>
-            <a:r>
-              <a:rPr lang="pt-BR" sz="2800" dirty="0" err="1"/>
-              <a:t>ox</a:t>
-            </a:r>
-            <a:r>
-              <a:rPr lang="pt-BR" sz="2800" dirty="0"/>
-              <a:t> </a:t>
-            </a:r>
-            <a:r>
-              <a:rPr lang="pt-BR" sz="2800" dirty="0" err="1"/>
-              <a:t>ooxo</a:t>
-            </a:r>
-            <a:r>
-              <a:rPr lang="pt-BR" sz="2800" dirty="0"/>
-              <a:t> </a:t>
-            </a:r>
-            <a:r>
-              <a:rPr lang="pt-BR" sz="2800" dirty="0" err="1"/>
-              <a:t>xo</a:t>
-            </a:r>
-            <a:r>
-              <a:rPr lang="pt-BR" sz="2800" dirty="0"/>
-              <a:t> </a:t>
-            </a:r>
-            <a:r>
-              <a:rPr lang="pt-BR" sz="2800" dirty="0" err="1"/>
-              <a:t>ox</a:t>
-            </a:r>
-            <a:r>
-              <a:rPr lang="pt-BR" sz="2800" dirty="0"/>
-              <a:t> </a:t>
-            </a:r>
-            <a:r>
-              <a:rPr lang="pt-BR" sz="2800" dirty="0" err="1"/>
-              <a:t>ox</a:t>
-            </a:r>
-            <a:r>
-              <a:rPr lang="pt-BR" sz="2800" dirty="0"/>
-              <a:t> </a:t>
-            </a:r>
-            <a:r>
-              <a:rPr lang="pt-BR" sz="2800" dirty="0" err="1"/>
-              <a:t>oo</a:t>
-            </a:r>
-            <a:r>
-              <a:rPr lang="pt-BR" sz="2800" dirty="0"/>
-              <a:t> </a:t>
-            </a:r>
-            <a:r>
-              <a:rPr lang="pt-BR" sz="2800" dirty="0" err="1"/>
-              <a:t>xo</a:t>
-            </a:r>
-            <a:r>
-              <a:rPr lang="pt-BR" sz="2800" dirty="0"/>
-              <a:t> </a:t>
-            </a:r>
-            <a:r>
-              <a:rPr lang="pt-BR" sz="2800" dirty="0" err="1"/>
-              <a:t>ox</a:t>
-            </a:r>
-            <a:r>
-              <a:rPr lang="pt-BR" sz="2800" dirty="0"/>
-              <a:t> </a:t>
-            </a:r>
-            <a:r>
-              <a:rPr lang="pt-BR" sz="2800" dirty="0" err="1"/>
-              <a:t>ox</a:t>
-            </a:r>
-            <a:r>
-              <a:rPr lang="pt-BR" sz="2800" dirty="0"/>
-              <a:t> </a:t>
-            </a:r>
-            <a:r>
-              <a:rPr lang="pt-BR" sz="2800" dirty="0" err="1"/>
-              <a:t>ox</a:t>
-            </a:r>
-            <a:r>
-              <a:rPr lang="pt-BR" sz="2800" dirty="0"/>
-              <a:t> </a:t>
-            </a:r>
-            <a:r>
-              <a:rPr lang="pt-BR" sz="2800" dirty="0" err="1"/>
-              <a:t>ox</a:t>
-            </a:r>
-            <a:r>
-              <a:rPr lang="pt-BR" sz="2800" dirty="0"/>
-              <a:t> .</a:t>
-            </a:r>
-          </a:p>
-          <a:p>
-            <a:pPr algn="just"/>
-            <a:r>
-              <a:rPr lang="pt-BR" sz="2800" dirty="0" err="1"/>
-              <a:t>Xoxoox</a:t>
-            </a:r>
-            <a:r>
-              <a:rPr lang="pt-BR" sz="2800" dirty="0"/>
-              <a:t> </a:t>
-            </a:r>
-            <a:r>
-              <a:rPr lang="pt-BR" sz="2800" dirty="0" err="1"/>
-              <a:t>ox</a:t>
-            </a:r>
-            <a:r>
-              <a:rPr lang="pt-BR" sz="2800" dirty="0"/>
-              <a:t> </a:t>
-            </a:r>
-            <a:r>
-              <a:rPr lang="pt-BR" sz="2800" dirty="0" err="1"/>
-              <a:t>oox</a:t>
-            </a:r>
-            <a:r>
-              <a:rPr lang="pt-BR" sz="2800" dirty="0"/>
-              <a:t> </a:t>
-            </a:r>
-            <a:r>
-              <a:rPr lang="pt-BR" sz="2800" dirty="0" err="1"/>
-              <a:t>xoooxoox</a:t>
-            </a:r>
-            <a:r>
-              <a:rPr lang="pt-BR" sz="2800" dirty="0"/>
-              <a:t> </a:t>
-            </a:r>
-            <a:r>
-              <a:rPr lang="pt-BR" sz="2800" dirty="0" err="1"/>
-              <a:t>ox</a:t>
-            </a:r>
-            <a:r>
-              <a:rPr lang="pt-BR" sz="2800" dirty="0"/>
-              <a:t> </a:t>
-            </a:r>
-            <a:r>
-              <a:rPr lang="pt-BR" sz="2800" dirty="0" err="1"/>
-              <a:t>oxo</a:t>
-            </a:r>
-            <a:r>
-              <a:rPr lang="pt-BR" sz="2800" dirty="0"/>
-              <a:t> </a:t>
-            </a:r>
-            <a:r>
-              <a:rPr lang="pt-BR" sz="2800" dirty="0" err="1"/>
-              <a:t>ox</a:t>
-            </a:r>
-            <a:r>
-              <a:rPr lang="pt-BR" sz="2800" dirty="0"/>
-              <a:t> </a:t>
-            </a:r>
-            <a:r>
-              <a:rPr lang="pt-BR" sz="2800" dirty="0" err="1"/>
-              <a:t>ox</a:t>
-            </a:r>
-            <a:r>
-              <a:rPr lang="pt-BR" sz="2800" dirty="0"/>
-              <a:t> </a:t>
-            </a:r>
-            <a:r>
-              <a:rPr lang="pt-BR" sz="2800" dirty="0" err="1"/>
-              <a:t>oxo</a:t>
-            </a:r>
-            <a:r>
-              <a:rPr lang="pt-BR" sz="2800" dirty="0"/>
-              <a:t> </a:t>
-            </a:r>
-            <a:r>
-              <a:rPr lang="pt-BR" sz="2800" dirty="0" err="1"/>
-              <a:t>oxoox</a:t>
-            </a:r>
-            <a:r>
-              <a:rPr lang="pt-BR" sz="2800" dirty="0"/>
-              <a:t> </a:t>
-            </a:r>
-            <a:r>
-              <a:rPr lang="pt-BR" sz="2800" dirty="0" err="1"/>
-              <a:t>xo</a:t>
-            </a:r>
-            <a:r>
-              <a:rPr lang="pt-BR" sz="2800" dirty="0"/>
-              <a:t> </a:t>
-            </a:r>
-            <a:r>
-              <a:rPr lang="pt-BR" sz="2800" dirty="0" err="1"/>
-              <a:t>oox</a:t>
-            </a:r>
-            <a:r>
-              <a:rPr lang="pt-BR" sz="2800" dirty="0"/>
-              <a:t> </a:t>
-            </a:r>
-            <a:r>
-              <a:rPr lang="pt-BR" sz="2800" dirty="0" err="1"/>
-              <a:t>oxoxo</a:t>
-            </a:r>
-            <a:r>
-              <a:rPr lang="pt-BR" sz="2800" dirty="0"/>
-              <a:t> </a:t>
-            </a:r>
-            <a:r>
-              <a:rPr lang="pt-BR" sz="2800" dirty="0" err="1"/>
-              <a:t>xoxooxoxooxo</a:t>
-            </a:r>
-            <a:r>
-              <a:rPr lang="pt-BR" sz="2800" dirty="0"/>
-              <a:t> </a:t>
-            </a:r>
-            <a:r>
-              <a:rPr lang="pt-BR" sz="2800" dirty="0" err="1"/>
-              <a:t>xoo</a:t>
-            </a:r>
-            <a:r>
-              <a:rPr lang="pt-BR" sz="2800" dirty="0"/>
-              <a:t> </a:t>
-            </a:r>
-            <a:r>
-              <a:rPr lang="pt-BR" sz="2800" dirty="0" err="1"/>
-              <a:t>xox</a:t>
-            </a:r>
-            <a:r>
-              <a:rPr lang="pt-BR" sz="2800" dirty="0"/>
-              <a:t> </a:t>
-            </a:r>
-            <a:r>
-              <a:rPr lang="pt-BR" sz="2800" dirty="0" err="1"/>
-              <a:t>oxox</a:t>
-            </a:r>
-            <a:r>
-              <a:rPr lang="pt-BR" sz="2800" dirty="0"/>
-              <a:t> </a:t>
-            </a:r>
-            <a:r>
-              <a:rPr lang="pt-BR" sz="2800" dirty="0" err="1"/>
-              <a:t>ox</a:t>
-            </a:r>
-            <a:r>
-              <a:rPr lang="pt-BR" sz="2800" dirty="0"/>
-              <a:t> </a:t>
-            </a:r>
-            <a:r>
-              <a:rPr lang="pt-BR" sz="2800" dirty="0" err="1"/>
-              <a:t>ooxo</a:t>
-            </a:r>
-            <a:r>
-              <a:rPr lang="pt-BR" sz="2800" dirty="0"/>
-              <a:t> </a:t>
-            </a:r>
-            <a:r>
-              <a:rPr lang="pt-BR" sz="2800" dirty="0" err="1"/>
-              <a:t>xo</a:t>
-            </a:r>
-            <a:r>
-              <a:rPr lang="pt-BR" sz="2800" dirty="0"/>
-              <a:t> </a:t>
-            </a:r>
-            <a:r>
-              <a:rPr lang="pt-BR" sz="2800" dirty="0" err="1"/>
-              <a:t>ox</a:t>
-            </a:r>
-            <a:r>
-              <a:rPr lang="pt-BR" sz="2800" dirty="0"/>
-              <a:t> </a:t>
-            </a:r>
-            <a:r>
-              <a:rPr lang="pt-BR" sz="2800" dirty="0" err="1"/>
-              <a:t>ox</a:t>
-            </a:r>
-            <a:r>
-              <a:rPr lang="pt-BR" sz="2800" dirty="0"/>
-              <a:t> </a:t>
-            </a:r>
-            <a:r>
-              <a:rPr lang="pt-BR" sz="2800" dirty="0" err="1"/>
-              <a:t>oo</a:t>
-            </a:r>
-            <a:r>
-              <a:rPr lang="pt-BR" sz="2800" dirty="0"/>
-              <a:t> </a:t>
-            </a:r>
-            <a:r>
-              <a:rPr lang="pt-BR" sz="2800" dirty="0" err="1"/>
-              <a:t>xo</a:t>
-            </a:r>
-            <a:r>
-              <a:rPr lang="pt-BR" sz="2800" dirty="0"/>
-              <a:t> </a:t>
-            </a:r>
-            <a:r>
-              <a:rPr lang="pt-BR" sz="2800" dirty="0" err="1"/>
-              <a:t>ox</a:t>
-            </a:r>
-            <a:r>
-              <a:rPr lang="pt-BR" sz="2800" dirty="0"/>
-              <a:t> </a:t>
-            </a:r>
-            <a:r>
-              <a:rPr lang="pt-BR" sz="2800" dirty="0" err="1"/>
-              <a:t>ox</a:t>
-            </a:r>
-            <a:r>
-              <a:rPr lang="pt-BR" sz="2800" dirty="0"/>
-              <a:t> </a:t>
-            </a:r>
-            <a:r>
-              <a:rPr lang="pt-BR" sz="2800" dirty="0" err="1"/>
-              <a:t>ox</a:t>
-            </a:r>
-            <a:r>
-              <a:rPr lang="pt-BR" sz="2800" dirty="0"/>
-              <a:t> </a:t>
-            </a:r>
-            <a:r>
-              <a:rPr lang="pt-BR" sz="2800" dirty="0" err="1"/>
-              <a:t>ox</a:t>
-            </a:r>
-            <a:r>
-              <a:rPr lang="pt-BR" sz="2800" dirty="0"/>
-              <a:t> </a:t>
-            </a:r>
-          </a:p>
-          <a:p>
-            <a:pPr algn="just"/>
-            <a:r>
-              <a:rPr lang="pt-BR" sz="2800" dirty="0" err="1"/>
-              <a:t>Xocooc</a:t>
-            </a:r>
-            <a:r>
-              <a:rPr lang="pt-BR" sz="2800" dirty="0"/>
-              <a:t> </a:t>
-            </a:r>
-            <a:r>
-              <a:rPr lang="pt-BR" sz="2800" dirty="0" err="1"/>
-              <a:t>Xoo</a:t>
-            </a:r>
-            <a:r>
-              <a:rPr lang="pt-BR" sz="2800" dirty="0"/>
-              <a:t> </a:t>
-            </a:r>
-            <a:r>
-              <a:rPr lang="pt-BR" sz="2800" dirty="0" err="1"/>
-              <a:t>xo</a:t>
-            </a:r>
-            <a:r>
-              <a:rPr lang="pt-BR" sz="2800" dirty="0"/>
-              <a:t> </a:t>
-            </a:r>
-            <a:r>
-              <a:rPr lang="pt-BR" sz="2800" dirty="0" err="1"/>
-              <a:t>xoxoxo</a:t>
-            </a:r>
-            <a:r>
-              <a:rPr lang="pt-BR" sz="2800" dirty="0"/>
-              <a:t> </a:t>
-            </a:r>
-            <a:r>
-              <a:rPr lang="pt-BR" sz="2800" dirty="0" err="1"/>
-              <a:t>xoxooxox</a:t>
-            </a:r>
-            <a:r>
-              <a:rPr lang="pt-BR" sz="2800" dirty="0"/>
-              <a:t> </a:t>
-            </a:r>
-            <a:r>
-              <a:rPr lang="pt-BR" sz="2800" dirty="0" err="1"/>
-              <a:t>xoxox</a:t>
-            </a:r>
-            <a:r>
-              <a:rPr lang="pt-BR" sz="2800" dirty="0"/>
-              <a:t> xoxo </a:t>
-            </a:r>
-            <a:r>
-              <a:rPr lang="pt-BR" sz="2800" dirty="0" err="1"/>
-              <a:t>x</a:t>
-            </a:r>
-            <a:r>
-              <a:rPr lang="pt-BR" sz="2800" dirty="0"/>
-              <a:t>.</a:t>
-            </a:r>
-          </a:p>
-          <a:p>
-            <a:pPr lvl="0" algn="just"/>
-            <a:r>
-              <a:rPr lang="pt-BR" sz="2800" dirty="0" err="1"/>
-              <a:t>Xxoox</a:t>
-            </a:r>
-            <a:r>
-              <a:rPr lang="pt-BR" sz="2800" dirty="0"/>
-              <a:t> </a:t>
-            </a:r>
-            <a:r>
-              <a:rPr lang="pt-BR" sz="2800" dirty="0" err="1"/>
-              <a:t>xo</a:t>
-            </a:r>
-            <a:r>
-              <a:rPr lang="pt-BR" sz="2800" dirty="0"/>
-              <a:t> </a:t>
-            </a:r>
-            <a:r>
-              <a:rPr lang="pt-BR" sz="2800" dirty="0" err="1"/>
-              <a:t>oox</a:t>
-            </a:r>
-            <a:r>
-              <a:rPr lang="pt-BR" sz="2800" dirty="0"/>
-              <a:t> </a:t>
-            </a:r>
-            <a:r>
-              <a:rPr lang="pt-BR" sz="2800" dirty="0" err="1"/>
-              <a:t>oxoxo</a:t>
-            </a:r>
-            <a:r>
-              <a:rPr lang="pt-BR" sz="2800" dirty="0"/>
-              <a:t> </a:t>
-            </a:r>
-            <a:r>
-              <a:rPr lang="pt-BR" sz="2800" dirty="0" err="1"/>
-              <a:t>xoxooxoxooxo</a:t>
-            </a:r>
-            <a:r>
-              <a:rPr lang="pt-BR" sz="2800" dirty="0"/>
-              <a:t> </a:t>
-            </a:r>
-            <a:r>
-              <a:rPr lang="pt-BR" sz="2800" dirty="0" err="1"/>
-              <a:t>xoo</a:t>
-            </a:r>
-            <a:r>
-              <a:rPr lang="pt-BR" sz="2800" dirty="0"/>
-              <a:t> </a:t>
-            </a:r>
-            <a:r>
-              <a:rPr lang="pt-BR" sz="2800" dirty="0" err="1"/>
-              <a:t>xox</a:t>
-            </a:r>
-            <a:r>
-              <a:rPr lang="pt-BR" sz="2800" dirty="0"/>
-              <a:t> </a:t>
-            </a:r>
-            <a:r>
-              <a:rPr lang="pt-BR" sz="2800" dirty="0" err="1"/>
-              <a:t>oxox</a:t>
-            </a:r>
-            <a:r>
-              <a:rPr lang="pt-BR" sz="2800" dirty="0"/>
-              <a:t> </a:t>
-            </a:r>
-            <a:r>
-              <a:rPr lang="pt-BR" sz="2800" dirty="0" err="1"/>
-              <a:t>ox</a:t>
-            </a:r>
-            <a:r>
-              <a:rPr lang="pt-BR" sz="2800" dirty="0"/>
-              <a:t> </a:t>
-            </a:r>
-            <a:r>
-              <a:rPr lang="pt-BR" sz="2800" dirty="0" err="1"/>
-              <a:t>ooxo</a:t>
-            </a:r>
-            <a:r>
-              <a:rPr lang="pt-BR" sz="2800" dirty="0"/>
-              <a:t> </a:t>
-            </a:r>
-            <a:r>
-              <a:rPr lang="pt-BR" sz="2800" dirty="0" err="1"/>
-              <a:t>xo</a:t>
-            </a:r>
-            <a:r>
-              <a:rPr lang="pt-BR" sz="2800" dirty="0"/>
-              <a:t> </a:t>
-            </a:r>
-            <a:r>
-              <a:rPr lang="pt-BR" sz="2800" dirty="0" err="1"/>
-              <a:t>ox</a:t>
-            </a:r>
-            <a:r>
-              <a:rPr lang="pt-BR" sz="2800" dirty="0"/>
-              <a:t> </a:t>
-            </a:r>
-            <a:r>
-              <a:rPr lang="pt-BR" sz="2800" dirty="0" err="1"/>
-              <a:t>Xoxooxx</a:t>
-            </a:r>
-            <a:r>
-              <a:rPr lang="pt-BR" sz="2800" dirty="0"/>
-              <a:t>  xoxo </a:t>
-            </a:r>
-            <a:r>
-              <a:rPr lang="pt-BR" sz="2800" dirty="0" err="1"/>
-              <a:t>xo</a:t>
-            </a:r>
-            <a:r>
-              <a:rPr lang="pt-BR" sz="2800" dirty="0"/>
-              <a:t> </a:t>
-            </a:r>
-            <a:r>
-              <a:rPr lang="pt-BR" sz="2800" dirty="0" err="1"/>
-              <a:t>xpxoxooxooxo</a:t>
-            </a:r>
-            <a:r>
-              <a:rPr lang="pt-BR" sz="2800" dirty="0"/>
-              <a:t>.</a:t>
-            </a:r>
-          </a:p>
-          <a:p>
-            <a:pPr lvl="0" algn="just"/>
-            <a:r>
-              <a:rPr lang="pt-BR" sz="2800" dirty="0" err="1"/>
-              <a:t>Xx</a:t>
-            </a:r>
-            <a:r>
-              <a:rPr lang="pt-BR" sz="2800" dirty="0"/>
-              <a:t> </a:t>
-            </a:r>
-            <a:r>
-              <a:rPr lang="pt-BR" sz="2800" dirty="0" err="1"/>
-              <a:t>oo</a:t>
-            </a:r>
-            <a:r>
-              <a:rPr lang="pt-BR" sz="2800" dirty="0"/>
-              <a:t> </a:t>
-            </a:r>
-            <a:r>
-              <a:rPr lang="pt-BR" sz="2800" dirty="0" err="1"/>
-              <a:t>xo</a:t>
-            </a:r>
-            <a:r>
-              <a:rPr lang="pt-BR" sz="2800" dirty="0"/>
-              <a:t> </a:t>
-            </a:r>
-            <a:r>
-              <a:rPr lang="pt-BR" sz="2800" dirty="0" err="1"/>
-              <a:t>ox</a:t>
-            </a:r>
-            <a:r>
-              <a:rPr lang="pt-BR" sz="2800" dirty="0"/>
-              <a:t> </a:t>
-            </a:r>
-            <a:r>
-              <a:rPr lang="pt-BR" sz="2800" dirty="0" err="1"/>
-              <a:t>ox</a:t>
-            </a:r>
-            <a:r>
-              <a:rPr lang="pt-BR" sz="2800" dirty="0"/>
-              <a:t> </a:t>
-            </a:r>
-            <a:r>
-              <a:rPr lang="pt-BR" sz="2800" dirty="0" err="1"/>
-              <a:t>ox</a:t>
-            </a:r>
-            <a:r>
-              <a:rPr lang="pt-BR" sz="2800" dirty="0"/>
-              <a:t> </a:t>
-            </a:r>
-            <a:r>
-              <a:rPr lang="pt-BR" sz="2800" dirty="0" err="1"/>
-              <a:t>ox</a:t>
-            </a:r>
-            <a:r>
-              <a:rPr lang="pt-BR" sz="2800" dirty="0"/>
-              <a:t> </a:t>
-            </a:r>
-            <a:r>
-              <a:rPr lang="pt-BR" sz="2800" dirty="0" err="1"/>
-              <a:t>ocooc</a:t>
-            </a:r>
-            <a:r>
-              <a:rPr lang="pt-BR" sz="2800" dirty="0"/>
-              <a:t> </a:t>
-            </a:r>
-            <a:r>
-              <a:rPr lang="pt-BR" sz="2800" dirty="0" err="1"/>
-              <a:t>Xoo</a:t>
-            </a:r>
-            <a:r>
-              <a:rPr lang="pt-BR" sz="2800" dirty="0"/>
-              <a:t> </a:t>
-            </a:r>
-            <a:r>
-              <a:rPr lang="pt-BR" sz="2800" dirty="0" err="1"/>
-              <a:t>xo</a:t>
-            </a:r>
-            <a:r>
-              <a:rPr lang="pt-BR" sz="2800" dirty="0"/>
-              <a:t> </a:t>
-            </a:r>
-            <a:r>
-              <a:rPr lang="pt-BR" sz="2800" dirty="0" err="1"/>
-              <a:t>xoxoxo</a:t>
-            </a:r>
-            <a:r>
-              <a:rPr lang="pt-BR" sz="2800" dirty="0"/>
-              <a:t> </a:t>
-            </a:r>
-            <a:r>
-              <a:rPr lang="pt-BR" sz="2800" dirty="0" err="1"/>
-              <a:t>xoxooxox</a:t>
-            </a:r>
-            <a:r>
-              <a:rPr lang="pt-BR" sz="2800" dirty="0"/>
-              <a:t> </a:t>
-            </a:r>
-            <a:r>
-              <a:rPr lang="pt-BR" sz="2800" dirty="0" err="1"/>
-              <a:t>xoxox</a:t>
-            </a:r>
-            <a:r>
-              <a:rPr lang="pt-BR" sz="2800" dirty="0"/>
-              <a:t> xoxo </a:t>
-            </a:r>
-            <a:r>
-              <a:rPr lang="pt-BR" sz="2800" dirty="0" err="1"/>
-              <a:t>xo</a:t>
-            </a:r>
-            <a:r>
-              <a:rPr lang="pt-BR" sz="2800" dirty="0"/>
-              <a:t> xoxo xoxo </a:t>
-            </a:r>
-            <a:r>
-              <a:rPr lang="pt-BR" sz="2800" dirty="0" err="1"/>
-              <a:t>xxxxxo</a:t>
-            </a:r>
-            <a:r>
-              <a:rPr lang="pt-BR" sz="2800" dirty="0"/>
-              <a:t> </a:t>
-            </a:r>
-            <a:r>
-              <a:rPr lang="pt-BR" sz="2800" dirty="0" err="1"/>
-              <a:t>xo</a:t>
-            </a:r>
-            <a:r>
-              <a:rPr lang="pt-BR" sz="2800" dirty="0"/>
-              <a:t>.</a:t>
-            </a:r>
+            <a:endParaRPr lang="pt-BR" sz="2800" dirty="0"/>
           </a:p>
         </p:txBody>
       </p:sp>
@@ -7809,7 +4424,7 @@
             <a:pPr algn="just"/>
             <a:r>
               <a:rPr lang="pt-BR" sz="3400" b="1" dirty="0"/>
-              <a:t>5 - Referência Bibliográfica </a:t>
+              <a:t>4 - Referência Bibliográfica </a:t>
             </a:r>
           </a:p>
           <a:p>
@@ -7928,7 +4543,7 @@
           <p:nvPr/>
         </p:nvPicPr>
         <p:blipFill>
-          <a:blip r:embed="rId5"/>
+          <a:blip r:embed="rId4"/>
           <a:stretch>
             <a:fillRect/>
           </a:stretch>
@@ -7943,6 +4558,269 @@
           </a:prstGeom>
         </p:spPr>
       </p:pic>
+      <p:grpSp>
+        <p:nvGrpSpPr>
+          <p:cNvPr id="58" name="Agrupar 57">
+            <a:extLst>
+              <a:ext uri="{FF2B5EF4-FFF2-40B4-BE49-F238E27FC236}">
+                <a16:creationId xmlns:a16="http://schemas.microsoft.com/office/drawing/2014/main" id="{B7D61FFD-C7E9-4F3F-AFEF-603209667458}"/>
+              </a:ext>
+            </a:extLst>
+          </p:cNvPr>
+          <p:cNvGrpSpPr/>
+          <p:nvPr/>
+        </p:nvGrpSpPr>
+        <p:grpSpPr>
+          <a:xfrm>
+            <a:off x="11035747" y="12363698"/>
+            <a:ext cx="9620468" cy="5441038"/>
+            <a:chOff x="568797" y="23533057"/>
+            <a:chExt cx="9620468" cy="5441038"/>
+          </a:xfrm>
+        </p:grpSpPr>
+        <p:sp>
+          <p:nvSpPr>
+            <p:cNvPr id="15" name="CaixaDeTexto 61"/>
+            <p:cNvSpPr txBox="1"/>
+            <p:nvPr/>
+          </p:nvSpPr>
+          <p:spPr>
+            <a:xfrm>
+              <a:off x="568797" y="23533057"/>
+              <a:ext cx="9538785" cy="400110"/>
+            </a:xfrm>
+            <a:prstGeom prst="rect">
+              <a:avLst/>
+            </a:prstGeom>
+            <a:noFill/>
+          </p:spPr>
+          <p:txBody>
+            <a:bodyPr wrap="square" rtlCol="0">
+              <a:spAutoFit/>
+            </a:bodyPr>
+            <a:lstStyle/>
+            <a:p>
+              <a:pPr algn="ctr"/>
+              <a:r>
+                <a:rPr lang="pt-BR" sz="2000" i="1" dirty="0"/>
+                <a:t>Figura 1 – Palíndromo em Python</a:t>
+              </a:r>
+            </a:p>
+          </p:txBody>
+        </p:sp>
+        <p:pic>
+          <p:nvPicPr>
+            <p:cNvPr id="55" name="Imagem 54">
+              <a:extLst>
+                <a:ext uri="{FF2B5EF4-FFF2-40B4-BE49-F238E27FC236}">
+                  <a16:creationId xmlns:a16="http://schemas.microsoft.com/office/drawing/2014/main" id="{60A4F36A-EDE3-4280-85EF-009DD40B8C19}"/>
+                </a:ext>
+              </a:extLst>
+            </p:cNvPr>
+            <p:cNvPicPr>
+              <a:picLocks noChangeAspect="1"/>
+            </p:cNvPicPr>
+            <p:nvPr/>
+          </p:nvPicPr>
+          <p:blipFill>
+            <a:blip r:embed="rId5"/>
+            <a:stretch>
+              <a:fillRect/>
+            </a:stretch>
+          </p:blipFill>
+          <p:spPr>
+            <a:xfrm>
+              <a:off x="626655" y="24021997"/>
+              <a:ext cx="9562610" cy="4952098"/>
+            </a:xfrm>
+            <a:prstGeom prst="rect">
+              <a:avLst/>
+            </a:prstGeom>
+          </p:spPr>
+        </p:pic>
+      </p:grpSp>
+      <p:grpSp>
+        <p:nvGrpSpPr>
+          <p:cNvPr id="61" name="Agrupar 60">
+            <a:extLst>
+              <a:ext uri="{FF2B5EF4-FFF2-40B4-BE49-F238E27FC236}">
+                <a16:creationId xmlns:a16="http://schemas.microsoft.com/office/drawing/2014/main" id="{588762FD-53F1-488C-80CF-61283BAE57E6}"/>
+              </a:ext>
+            </a:extLst>
+          </p:cNvPr>
+          <p:cNvGrpSpPr/>
+          <p:nvPr/>
+        </p:nvGrpSpPr>
+        <p:grpSpPr>
+          <a:xfrm>
+            <a:off x="386425" y="20890953"/>
+            <a:ext cx="9538784" cy="8345231"/>
+            <a:chOff x="386425" y="20890953"/>
+            <a:chExt cx="9538784" cy="8345231"/>
+          </a:xfrm>
+        </p:grpSpPr>
+        <p:sp>
+          <p:nvSpPr>
+            <p:cNvPr id="16" name="CaixaDeTexto 61"/>
+            <p:cNvSpPr txBox="1"/>
+            <p:nvPr/>
+          </p:nvSpPr>
+          <p:spPr>
+            <a:xfrm>
+              <a:off x="386425" y="20890953"/>
+              <a:ext cx="9538784" cy="400110"/>
+            </a:xfrm>
+            <a:prstGeom prst="rect">
+              <a:avLst/>
+            </a:prstGeom>
+            <a:noFill/>
+          </p:spPr>
+          <p:txBody>
+            <a:bodyPr wrap="square" rtlCol="0">
+              <a:spAutoFit/>
+            </a:bodyPr>
+            <a:lstStyle/>
+            <a:p>
+              <a:pPr algn="ctr"/>
+              <a:r>
+                <a:rPr lang="pt-BR" sz="2000" i="1" dirty="0"/>
+                <a:t>Figura 1 – Palíndromo em C</a:t>
+              </a:r>
+            </a:p>
+          </p:txBody>
+        </p:sp>
+        <p:pic>
+          <p:nvPicPr>
+            <p:cNvPr id="57" name="Imagem 56">
+              <a:extLst>
+                <a:ext uri="{FF2B5EF4-FFF2-40B4-BE49-F238E27FC236}">
+                  <a16:creationId xmlns:a16="http://schemas.microsoft.com/office/drawing/2014/main" id="{D141B500-4012-4CD4-99C6-2D8C86BABAF1}"/>
+                </a:ext>
+              </a:extLst>
+            </p:cNvPr>
+            <p:cNvPicPr>
+              <a:picLocks noChangeAspect="1"/>
+            </p:cNvPicPr>
+            <p:nvPr/>
+          </p:nvPicPr>
+          <p:blipFill>
+            <a:blip r:embed="rId6"/>
+            <a:stretch>
+              <a:fillRect/>
+            </a:stretch>
+          </p:blipFill>
+          <p:spPr>
+            <a:xfrm>
+              <a:off x="1273535" y="21429192"/>
+              <a:ext cx="7764563" cy="7806992"/>
+            </a:xfrm>
+            <a:prstGeom prst="rect">
+              <a:avLst/>
+            </a:prstGeom>
+          </p:spPr>
+        </p:pic>
+      </p:grpSp>
+      <p:sp>
+        <p:nvSpPr>
+          <p:cNvPr id="59" name="Round Diagonal Corner Rectangle 40">
+            <a:extLst>
+              <a:ext uri="{FF2B5EF4-FFF2-40B4-BE49-F238E27FC236}">
+                <a16:creationId xmlns:a16="http://schemas.microsoft.com/office/drawing/2014/main" id="{A5E09B72-BCD3-44FC-8BAA-827860ADF6FB}"/>
+              </a:ext>
+            </a:extLst>
+          </p:cNvPr>
+          <p:cNvSpPr/>
+          <p:nvPr/>
+        </p:nvSpPr>
+        <p:spPr>
+          <a:xfrm>
+            <a:off x="22356034" y="9721200"/>
+            <a:ext cx="5169603" cy="662937"/>
+          </a:xfrm>
+          <a:prstGeom prst="round2DiagRect">
+            <a:avLst/>
+          </a:prstGeom>
+          <a:solidFill>
+            <a:srgbClr val="2B713A">
+              <a:alpha val="64000"/>
+            </a:srgbClr>
+          </a:solidFill>
+          <a:ln>
+            <a:noFill/>
+          </a:ln>
+          <a:effectLst/>
+        </p:spPr>
+        <p:style>
+          <a:lnRef idx="1">
+            <a:schemeClr val="accent1"/>
+          </a:lnRef>
+          <a:fillRef idx="3">
+            <a:schemeClr val="accent1"/>
+          </a:fillRef>
+          <a:effectRef idx="2">
+            <a:schemeClr val="accent1"/>
+          </a:effectRef>
+          <a:fontRef idx="minor">
+            <a:schemeClr val="lt1"/>
+          </a:fontRef>
+        </p:style>
+        <p:txBody>
+          <a:bodyPr lIns="258830" tIns="129415" rIns="258830" bIns="129415" rtlCol="0" anchor="ctr"/>
+          <a:lstStyle/>
+          <a:p>
+            <a:pPr algn="ctr"/>
+            <a:endParaRPr lang="en-US" dirty="0"/>
+          </a:p>
+        </p:txBody>
+      </p:sp>
+      <p:sp>
+        <p:nvSpPr>
+          <p:cNvPr id="60" name="CaixaDeTexto 37">
+            <a:extLst>
+              <a:ext uri="{FF2B5EF4-FFF2-40B4-BE49-F238E27FC236}">
+                <a16:creationId xmlns:a16="http://schemas.microsoft.com/office/drawing/2014/main" id="{902A8054-D14B-423A-82CF-4DE8A5771E7D}"/>
+              </a:ext>
+            </a:extLst>
+          </p:cNvPr>
+          <p:cNvSpPr txBox="1"/>
+          <p:nvPr/>
+        </p:nvSpPr>
+        <p:spPr>
+          <a:xfrm>
+            <a:off x="22851686" y="9725646"/>
+            <a:ext cx="9538785" cy="1200329"/>
+          </a:xfrm>
+          <a:prstGeom prst="rect">
+            <a:avLst/>
+          </a:prstGeom>
+          <a:noFill/>
+        </p:spPr>
+        <p:txBody>
+          <a:bodyPr wrap="square" rtlCol="0">
+            <a:spAutoFit/>
+          </a:bodyPr>
+          <a:lstStyle/>
+          <a:p>
+            <a:pPr algn="just"/>
+            <a:r>
+              <a:rPr lang="pt-BR" sz="3400" b="1" dirty="0"/>
+              <a:t>3 – Resultados</a:t>
+            </a:r>
+          </a:p>
+          <a:p>
+            <a:pPr algn="just"/>
+            <a:endParaRPr lang="pt-BR" sz="1000" b="1" dirty="0"/>
+          </a:p>
+          <a:p>
+            <a:pPr algn="just"/>
+            <a:r>
+              <a:rPr lang="pt-BR" sz="2800" dirty="0" err="1"/>
+              <a:t>Xoxoox</a:t>
+            </a:r>
+            <a:endParaRPr lang="pt-BR" sz="2800" dirty="0"/>
+          </a:p>
+        </p:txBody>
+      </p:sp>
     </p:spTree>
     <p:extLst>
       <p:ext uri="{BB962C8B-B14F-4D97-AF65-F5344CB8AC3E}">

</xml_diff>

<commit_message>
C# e modificação no Templete com exigencia do Glauco
</commit_message>
<xml_diff>
--- a/Templete/Codigo e suas linguagens - Templete.pptx
+++ b/Templete/Codigo e suas linguagens - Templete.pptx
@@ -221,7 +221,7 @@
             <a:fld id="{8F42E566-459B-4291-8411-523B07E86832}" type="datetimeFigureOut">
               <a:rPr lang="pt-BR" smtClean="0"/>
               <a:pPr/>
-              <a:t>04/10/2018</a:t>
+              <a:t>05/10/2018</a:t>
             </a:fld>
             <a:endParaRPr lang="pt-BR"/>
           </a:p>
@@ -821,7 +821,7 @@
             <a:fld id="{CB80F9A9-F103-0044-8BC7-AF5B19ABA5FA}" type="datetimeFigureOut">
               <a:rPr lang="en-US" smtClean="0"/>
               <a:pPr/>
-              <a:t>10/4/2018</a:t>
+              <a:t>10/5/2018</a:t>
             </a:fld>
             <a:endParaRPr lang="en-US"/>
           </a:p>
@@ -993,7 +993,7 @@
             <a:fld id="{CB80F9A9-F103-0044-8BC7-AF5B19ABA5FA}" type="datetimeFigureOut">
               <a:rPr lang="en-US" smtClean="0"/>
               <a:pPr/>
-              <a:t>10/4/2018</a:t>
+              <a:t>10/5/2018</a:t>
             </a:fld>
             <a:endParaRPr lang="en-US"/>
           </a:p>
@@ -1175,7 +1175,7 @@
             <a:fld id="{CB80F9A9-F103-0044-8BC7-AF5B19ABA5FA}" type="datetimeFigureOut">
               <a:rPr lang="en-US" smtClean="0"/>
               <a:pPr/>
-              <a:t>10/4/2018</a:t>
+              <a:t>10/5/2018</a:t>
             </a:fld>
             <a:endParaRPr lang="en-US"/>
           </a:p>
@@ -1347,7 +1347,7 @@
             <a:fld id="{CB80F9A9-F103-0044-8BC7-AF5B19ABA5FA}" type="datetimeFigureOut">
               <a:rPr lang="en-US" smtClean="0"/>
               <a:pPr/>
-              <a:t>10/4/2018</a:t>
+              <a:t>10/5/2018</a:t>
             </a:fld>
             <a:endParaRPr lang="en-US"/>
           </a:p>
@@ -1595,7 +1595,7 @@
             <a:fld id="{CB80F9A9-F103-0044-8BC7-AF5B19ABA5FA}" type="datetimeFigureOut">
               <a:rPr lang="en-US" smtClean="0"/>
               <a:pPr/>
-              <a:t>10/4/2018</a:t>
+              <a:t>10/5/2018</a:t>
             </a:fld>
             <a:endParaRPr lang="en-US"/>
           </a:p>
@@ -1885,7 +1885,7 @@
             <a:fld id="{CB80F9A9-F103-0044-8BC7-AF5B19ABA5FA}" type="datetimeFigureOut">
               <a:rPr lang="en-US" smtClean="0"/>
               <a:pPr/>
-              <a:t>10/4/2018</a:t>
+              <a:t>10/5/2018</a:t>
             </a:fld>
             <a:endParaRPr lang="en-US"/>
           </a:p>
@@ -2314,7 +2314,7 @@
             <a:fld id="{CB80F9A9-F103-0044-8BC7-AF5B19ABA5FA}" type="datetimeFigureOut">
               <a:rPr lang="en-US" smtClean="0"/>
               <a:pPr/>
-              <a:t>10/4/2018</a:t>
+              <a:t>10/5/2018</a:t>
             </a:fld>
             <a:endParaRPr lang="en-US"/>
           </a:p>
@@ -2434,7 +2434,7 @@
             <a:fld id="{CB80F9A9-F103-0044-8BC7-AF5B19ABA5FA}" type="datetimeFigureOut">
               <a:rPr lang="en-US" smtClean="0"/>
               <a:pPr/>
-              <a:t>10/4/2018</a:t>
+              <a:t>10/5/2018</a:t>
             </a:fld>
             <a:endParaRPr lang="en-US"/>
           </a:p>
@@ -2531,7 +2531,7 @@
             <a:fld id="{CB80F9A9-F103-0044-8BC7-AF5B19ABA5FA}" type="datetimeFigureOut">
               <a:rPr lang="en-US" smtClean="0"/>
               <a:pPr/>
-              <a:t>10/4/2018</a:t>
+              <a:t>10/5/2018</a:t>
             </a:fld>
             <a:endParaRPr lang="en-US"/>
           </a:p>
@@ -2810,7 +2810,7 @@
             <a:fld id="{CB80F9A9-F103-0044-8BC7-AF5B19ABA5FA}" type="datetimeFigureOut">
               <a:rPr lang="en-US" smtClean="0"/>
               <a:pPr/>
-              <a:t>10/4/2018</a:t>
+              <a:t>10/5/2018</a:t>
             </a:fld>
             <a:endParaRPr lang="en-US"/>
           </a:p>
@@ -3065,7 +3065,7 @@
             <a:fld id="{CB80F9A9-F103-0044-8BC7-AF5B19ABA5FA}" type="datetimeFigureOut">
               <a:rPr lang="en-US" smtClean="0"/>
               <a:pPr/>
-              <a:t>10/4/2018</a:t>
+              <a:t>10/5/2018</a:t>
             </a:fld>
             <a:endParaRPr lang="en-US"/>
           </a:p>
@@ -3280,7 +3280,7 @@
             <a:fld id="{CB80F9A9-F103-0044-8BC7-AF5B19ABA5FA}" type="datetimeFigureOut">
               <a:rPr lang="en-US" smtClean="0"/>
               <a:pPr/>
-              <a:t>10/4/2018</a:t>
+              <a:t>10/5/2018</a:t>
             </a:fld>
             <a:endParaRPr lang="en-US"/>
           </a:p>
@@ -3678,7 +3678,7 @@
         </p:blipFill>
         <p:spPr>
           <a:xfrm>
-            <a:off x="-26881" y="-1"/>
+            <a:off x="9132" y="48989"/>
             <a:ext cx="21370124" cy="30275213"/>
           </a:xfrm>
           <a:prstGeom prst="rect">
@@ -3740,7 +3740,7 @@
         </p:nvSpPr>
         <p:spPr>
           <a:xfrm>
-            <a:off x="11584774" y="2409174"/>
+            <a:off x="11584774" y="2453417"/>
             <a:ext cx="7066710" cy="1133298"/>
           </a:xfrm>
           <a:prstGeom prst="rect">
@@ -3788,7 +3788,7 @@
         </p:nvSpPr>
         <p:spPr>
           <a:xfrm>
-            <a:off x="10676378" y="3877046"/>
+            <a:off x="10676378" y="3921289"/>
             <a:ext cx="5680008" cy="1000021"/>
           </a:xfrm>
           <a:prstGeom prst="rect">
@@ -3830,7 +3830,7 @@
         </p:nvSpPr>
         <p:spPr>
           <a:xfrm>
-            <a:off x="-13786" y="9044091"/>
+            <a:off x="-13786" y="10089117"/>
             <a:ext cx="5169603" cy="662937"/>
           </a:xfrm>
           <a:prstGeom prst="round2DiagRect">
@@ -3877,7 +3877,7 @@
         </p:nvSpPr>
         <p:spPr>
           <a:xfrm>
-            <a:off x="632052" y="5618850"/>
+            <a:off x="632052" y="5692589"/>
             <a:ext cx="10952721" cy="1138521"/>
           </a:xfrm>
           <a:prstGeom prst="rect">
@@ -3919,8 +3919,8 @@
         </p:nvSpPr>
         <p:spPr>
           <a:xfrm>
-            <a:off x="650479" y="9007041"/>
-            <a:ext cx="9538785" cy="6401753"/>
+            <a:off x="650479" y="10052067"/>
+            <a:ext cx="9538785" cy="6832640"/>
           </a:xfrm>
           <a:prstGeom prst="rect">
             <a:avLst/>
@@ -3969,6 +3969,10 @@
               <a:t> que fornece (e determina) a visão que o programador possui sobre a estruturação e execução do programa. Por exemplo: Na programação orientada a objetos, os programadores podem abstrair um programa como uma coleção de objetos que interagem entre si, enquanto em programação funcional os programadores abstraem o programa como uma sequência de funções executadas de modo empilhado.</a:t>
             </a:r>
           </a:p>
+          <a:p>
+            <a:pPr lvl="0" algn="just"/>
+            <a:endParaRPr lang="pt-BR" sz="2800" dirty="0"/>
+          </a:p>
         </p:txBody>
       </p:sp>
       <p:sp>
@@ -3979,7 +3983,7 @@
         </p:nvSpPr>
         <p:spPr>
           <a:xfrm>
-            <a:off x="33870" y="6899766"/>
+            <a:off x="33870" y="7356966"/>
             <a:ext cx="21390867" cy="1569660"/>
           </a:xfrm>
           <a:prstGeom prst="rect">
@@ -4100,7 +4104,7 @@
         </p:nvSpPr>
         <p:spPr>
           <a:xfrm>
-            <a:off x="37010" y="8597629"/>
+            <a:off x="37010" y="9054829"/>
             <a:ext cx="21390867" cy="400110"/>
           </a:xfrm>
           <a:prstGeom prst="rect">
@@ -4178,7 +4182,7 @@
         </p:nvSpPr>
         <p:spPr>
           <a:xfrm>
-            <a:off x="-13786" y="15619927"/>
+            <a:off x="-13786" y="17239399"/>
             <a:ext cx="5169603" cy="662937"/>
           </a:xfrm>
           <a:prstGeom prst="round2DiagRect">
@@ -4225,8 +4229,8 @@
         </p:nvSpPr>
         <p:spPr>
           <a:xfrm>
-            <a:off x="626654" y="15589997"/>
-            <a:ext cx="9538785" cy="2954655"/>
+            <a:off x="626654" y="17239399"/>
+            <a:ext cx="9538785" cy="5970865"/>
           </a:xfrm>
           <a:prstGeom prst="rect">
             <a:avLst/>
@@ -4253,7 +4257,18 @@
             <a:pPr algn="just"/>
             <a:r>
               <a:rPr lang="pt-BR" sz="2800" dirty="0"/>
-              <a:t>              Dentre as diversas linguagens de programação a escolha da melhor linguagem para desenvolver uma determinada aplicação sempre é um desafio. Assim, a depuração e manutenção de código pode ser reduzida, com o objetivo de ganhar tempo.</a:t>
+              <a:t>	Para fins comparativos entre as diversas linguagens de programação existentes, realizamos uma aplicação para determinar se um conjunto de caracteres é palíndromo ou não, ou seja, se lido da direita para esquerda ou da esquerda para direita não houver diferença, significa que é formado pela mesma sequência de caracteres.</a:t>
+            </a:r>
+          </a:p>
+          <a:p>
+            <a:pPr algn="just"/>
+            <a:endParaRPr lang="pt-BR" sz="2800" dirty="0"/>
+          </a:p>
+          <a:p>
+            <a:pPr algn="just"/>
+            <a:r>
+              <a:rPr lang="pt-BR" sz="2800" dirty="0"/>
+              <a:t>	Diante disso, ao comparar as sintaxes e estratégias de programação das linguagens com níveis diferentes, desde as que mais se aproximam da forma que o computador “compreende” o código até linguagens que se aproximam mais da escrita humana.</a:t>
             </a:r>
           </a:p>
         </p:txBody>
@@ -4266,7 +4281,7 @@
         </p:nvSpPr>
         <p:spPr>
           <a:xfrm>
-            <a:off x="10676378" y="18332972"/>
+            <a:off x="10722097" y="17080107"/>
             <a:ext cx="5169603" cy="662937"/>
           </a:xfrm>
           <a:prstGeom prst="round2DiagRect">
@@ -4314,7 +4329,7 @@
         <p:spPr>
           <a:xfrm>
             <a:off x="11210394" y="9617332"/>
-            <a:ext cx="9538785" cy="1538883"/>
+            <a:ext cx="9538785" cy="677108"/>
           </a:xfrm>
           <a:prstGeom prst="rect">
             <a:avLst/>
@@ -4334,7 +4349,7 @@
             <a:pPr algn="just"/>
             <a:r>
               <a:rPr lang="pt-BR" sz="2800" dirty="0"/>
-              <a:t>          Diante disso, um planejamento prévio realizado de maneira correta é fundamental, visto que, cada linguagem tem suas propriedades que podem facilitar a codificação.</a:t>
+              <a:t>        </a:t>
             </a:r>
           </a:p>
         </p:txBody>
@@ -4347,7 +4362,7 @@
         </p:nvSpPr>
         <p:spPr>
           <a:xfrm>
-            <a:off x="11234929" y="18332972"/>
+            <a:off x="11210394" y="17080107"/>
             <a:ext cx="9538785" cy="4216539"/>
           </a:xfrm>
           <a:prstGeom prst="rect">
@@ -4363,8 +4378,8 @@
           <a:p>
             <a:pPr algn="just"/>
             <a:r>
-              <a:rPr lang="pt-BR" sz="3400" b="1" dirty="0"/>
-              <a:t>3 – Conclusão</a:t>
+              <a:rPr lang="pt-BR" sz="3600" b="1" dirty="0"/>
+              <a:t>4 – Conclusão</a:t>
             </a:r>
           </a:p>
           <a:p>
@@ -4399,7 +4414,7 @@
         </p:nvSpPr>
         <p:spPr>
           <a:xfrm>
-            <a:off x="10676378" y="22875543"/>
+            <a:off x="10676378" y="22079130"/>
             <a:ext cx="5915026" cy="662937"/>
           </a:xfrm>
           <a:prstGeom prst="round2DiagRect">
@@ -4446,7 +4461,7 @@
         </p:nvSpPr>
         <p:spPr>
           <a:xfrm>
-            <a:off x="11244038" y="22875543"/>
+            <a:off x="11244038" y="22079130"/>
             <a:ext cx="9800437" cy="2923877"/>
           </a:xfrm>
           <a:prstGeom prst="rect">
@@ -4463,7 +4478,7 @@
             <a:pPr algn="just"/>
             <a:r>
               <a:rPr lang="pt-BR" sz="3400" b="1" dirty="0"/>
-              <a:t>4 - Referência Bibliográfica </a:t>
+              <a:t>5 - Referência Bibliográfica </a:t>
             </a:r>
           </a:p>
           <a:p>
@@ -4528,7 +4543,7 @@
         </p:blipFill>
         <p:spPr>
           <a:xfrm>
-            <a:off x="17253458" y="26296412"/>
+            <a:off x="17223961" y="26534842"/>
             <a:ext cx="2809626" cy="2809626"/>
           </a:xfrm>
           <a:prstGeom prst="rect">
@@ -4550,7 +4565,7 @@
         </p:nvGrpSpPr>
         <p:grpSpPr>
           <a:xfrm>
-            <a:off x="10954063" y="11826720"/>
+            <a:off x="10868390" y="10294440"/>
             <a:ext cx="10090411" cy="5719518"/>
             <a:chOff x="568797" y="23533057"/>
             <a:chExt cx="9620468" cy="5441038"/>
@@ -4565,7 +4580,7 @@
           <p:spPr>
             <a:xfrm>
               <a:off x="568797" y="23533057"/>
-              <a:ext cx="9538785" cy="400110"/>
+              <a:ext cx="9538785" cy="380629"/>
             </a:xfrm>
             <a:prstGeom prst="rect">
               <a:avLst/>
@@ -4581,7 +4596,7 @@
               <a:pPr algn="ctr"/>
               <a:r>
                 <a:rPr lang="pt-BR" sz="2000" i="1" dirty="0"/>
-                <a:t>Figura 2 – Palíndromo em Python</a:t>
+                <a:t>Figura 1 – Palíndromo em Python</a:t>
               </a:r>
             </a:p>
           </p:txBody>
@@ -4617,87 +4632,106 @@
           </p:spPr>
         </p:pic>
       </p:grpSp>
-      <p:grpSp>
-        <p:nvGrpSpPr>
-          <p:cNvPr id="61" name="Agrupar 60">
+      <p:sp>
+        <p:nvSpPr>
+          <p:cNvPr id="26" name="Round Diagonal Corner Rectangle 38">
             <a:extLst>
               <a:ext uri="{FF2B5EF4-FFF2-40B4-BE49-F238E27FC236}">
-                <a16:creationId xmlns:a16="http://schemas.microsoft.com/office/drawing/2014/main" id="{588762FD-53F1-488C-80CF-61283BAE57E6}"/>
+                <a16:creationId xmlns:a16="http://schemas.microsoft.com/office/drawing/2014/main" id="{72295083-9061-48E5-9B97-E392416B01DA}"/>
               </a:ext>
             </a:extLst>
           </p:cNvPr>
-          <p:cNvGrpSpPr/>
+          <p:cNvSpPr/>
           <p:nvPr/>
-        </p:nvGrpSpPr>
-        <p:grpSpPr>
+        </p:nvSpPr>
+        <p:spPr>
           <a:xfrm>
-            <a:off x="215472" y="19218378"/>
-            <a:ext cx="9997303" cy="8892048"/>
-            <a:chOff x="386425" y="20890953"/>
-            <a:chExt cx="9538784" cy="8345231"/>
+            <a:off x="-10048" y="23792600"/>
+            <a:ext cx="5169603" cy="662937"/>
           </a:xfrm>
-        </p:grpSpPr>
-        <p:sp>
-          <p:nvSpPr>
-            <p:cNvPr id="16" name="CaixaDeTexto 61"/>
-            <p:cNvSpPr txBox="1"/>
-            <p:nvPr/>
-          </p:nvSpPr>
-          <p:spPr>
-            <a:xfrm>
-              <a:off x="386425" y="20890953"/>
-              <a:ext cx="9538784" cy="400110"/>
-            </a:xfrm>
-            <a:prstGeom prst="rect">
-              <a:avLst/>
-            </a:prstGeom>
+          <a:prstGeom prst="round2DiagRect">
+            <a:avLst/>
+          </a:prstGeom>
+          <a:solidFill>
+            <a:srgbClr val="2B713A">
+              <a:alpha val="64000"/>
+            </a:srgbClr>
+          </a:solidFill>
+          <a:ln>
             <a:noFill/>
-          </p:spPr>
-          <p:txBody>
-            <a:bodyPr wrap="square" rtlCol="0">
-              <a:spAutoFit/>
-            </a:bodyPr>
-            <a:lstStyle/>
-            <a:p>
-              <a:pPr algn="ctr"/>
-              <a:r>
-                <a:rPr lang="pt-BR" sz="2000" i="1" dirty="0"/>
-                <a:t>Figura 1 – Palíndromo em C</a:t>
-              </a:r>
-            </a:p>
-          </p:txBody>
-        </p:sp>
-        <p:pic>
-          <p:nvPicPr>
-            <p:cNvPr id="57" name="Imagem 56">
-              <a:extLst>
-                <a:ext uri="{FF2B5EF4-FFF2-40B4-BE49-F238E27FC236}">
-                  <a16:creationId xmlns:a16="http://schemas.microsoft.com/office/drawing/2014/main" id="{D141B500-4012-4CD4-99C6-2D8C86BABAF1}"/>
-                </a:ext>
-              </a:extLst>
-            </p:cNvPr>
-            <p:cNvPicPr>
-              <a:picLocks noChangeAspect="1"/>
-            </p:cNvPicPr>
-            <p:nvPr/>
-          </p:nvPicPr>
-          <p:blipFill>
-            <a:blip r:embed="rId6"/>
-            <a:stretch>
-              <a:fillRect/>
-            </a:stretch>
-          </p:blipFill>
-          <p:spPr>
-            <a:xfrm>
-              <a:off x="1273535" y="21429192"/>
-              <a:ext cx="7764563" cy="7806992"/>
-            </a:xfrm>
-            <a:prstGeom prst="rect">
-              <a:avLst/>
-            </a:prstGeom>
-          </p:spPr>
-        </p:pic>
-      </p:grpSp>
+          </a:ln>
+          <a:effectLst/>
+        </p:spPr>
+        <p:style>
+          <a:lnRef idx="1">
+            <a:schemeClr val="accent1"/>
+          </a:lnRef>
+          <a:fillRef idx="3">
+            <a:schemeClr val="accent1"/>
+          </a:fillRef>
+          <a:effectRef idx="2">
+            <a:schemeClr val="accent1"/>
+          </a:effectRef>
+          <a:fontRef idx="minor">
+            <a:schemeClr val="lt1"/>
+          </a:fontRef>
+        </p:style>
+        <p:txBody>
+          <a:bodyPr lIns="258830" tIns="129415" rIns="258830" bIns="129415" rtlCol="0" anchor="ctr"/>
+          <a:lstStyle/>
+          <a:p>
+            <a:pPr algn="ctr"/>
+            <a:endParaRPr lang="en-US" dirty="0"/>
+          </a:p>
+        </p:txBody>
+      </p:sp>
+      <p:sp>
+        <p:nvSpPr>
+          <p:cNvPr id="27" name="CaixaDeTexto 37">
+            <a:extLst>
+              <a:ext uri="{FF2B5EF4-FFF2-40B4-BE49-F238E27FC236}">
+                <a16:creationId xmlns:a16="http://schemas.microsoft.com/office/drawing/2014/main" id="{9FDF1E56-CFC5-48DC-BE75-4BABB4B9F4C9}"/>
+              </a:ext>
+            </a:extLst>
+          </p:cNvPr>
+          <p:cNvSpPr txBox="1"/>
+          <p:nvPr/>
+        </p:nvSpPr>
+        <p:spPr>
+          <a:xfrm>
+            <a:off x="555356" y="23792600"/>
+            <a:ext cx="9538785" cy="3385542"/>
+          </a:xfrm>
+          <a:prstGeom prst="rect">
+            <a:avLst/>
+          </a:prstGeom>
+          <a:noFill/>
+        </p:spPr>
+        <p:txBody>
+          <a:bodyPr wrap="square" rtlCol="0">
+            <a:spAutoFit/>
+          </a:bodyPr>
+          <a:lstStyle/>
+          <a:p>
+            <a:pPr algn="just"/>
+            <a:r>
+              <a:rPr lang="pt-BR" sz="3600" b="1" dirty="0"/>
+              <a:t>3 – Resultados</a:t>
+            </a:r>
+          </a:p>
+          <a:p>
+            <a:pPr algn="just"/>
+            <a:endParaRPr lang="pt-BR" sz="1000" b="1" dirty="0"/>
+          </a:p>
+          <a:p>
+            <a:pPr lvl="0" algn="just"/>
+            <a:r>
+              <a:rPr lang="pt-BR" sz="2800" dirty="0"/>
+              <a:t>	 Assim, ao almejar o mesmo objetivo de verificação do palíndromo com linguagens menos usadas, atualmente, até as mais usadas, percebemos que alguns códigos são relativamente simples de serem compreendidos, já outros são mais abstratos e difíceis de serem entendidos porém, mesmo com diferenças significativas, é possível chegar ao mesmo resultado. </a:t>
+            </a:r>
+          </a:p>
+        </p:txBody>
+      </p:sp>
     </p:spTree>
     <p:extLst>
       <p:ext uri="{BB962C8B-B14F-4D97-AF65-F5344CB8AC3E}">

</xml_diff>

<commit_message>
Templete - Versao final
</commit_message>
<xml_diff>
--- a/Templete/Codigo e suas linguagens - Templete.pptx
+++ b/Templete/Codigo e suas linguagens - Templete.pptx
@@ -109,7 +109,7 @@
   </p:defaultTextStyle>
   <p:extLst>
     <p:ext uri="{EFAFB233-063F-42B5-8137-9DF3F51BA10A}">
-      <p15:sldGuideLst xmlns:p15="http://schemas.microsoft.com/office/powerpoint/2012/main">
+      <p15:sldGuideLst xmlns:p15="http://schemas.microsoft.com/office/powerpoint/2012/main" xmlns="">
         <p15:guide id="1" orient="horz" pos="9537">
           <p15:clr>
             <a:srgbClr val="A4A3A4"/>
@@ -131,7 +131,7 @@
   <p:cmAuthor id="1" name="Gabriel Yudi Sanefugi" initials="GYS" lastIdx="2" clrIdx="0">
     <p:extLst>
       <p:ext uri="{19B8F6BF-5375-455C-9EA6-DF929625EA0E}">
-        <p15:presenceInfo xmlns:p15="http://schemas.microsoft.com/office/powerpoint/2012/main" userId="abd8702171da7244" providerId="Windows Live"/>
+        <p15:presenceInfo xmlns:p15="http://schemas.microsoft.com/office/powerpoint/2012/main" xmlns="" userId="abd8702171da7244" providerId="Windows Live"/>
       </p:ext>
     </p:extLst>
   </p:cmAuthor>
@@ -4257,8 +4257,41 @@
             <a:pPr algn="just"/>
             <a:r>
               <a:rPr lang="pt-BR" sz="2800" dirty="0"/>
-              <a:t>	Para fins comparativos entre as diversas linguagens de programação existentes, realizamos uma aplicação para determinar se um conjunto de caracteres é palíndromo ou não, ou seja, se lido da direita para esquerda ou da esquerda para direita não houver diferença, significa que é formado pela mesma sequência de caracteres.</a:t>
-            </a:r>
+              <a:t>	Para fins comparativos entre as diversas linguagens de programação existentes, realizamos uma aplicação para determinar se um conjunto de caracteres é palíndromo ou não, ou seja, </a:t>
+            </a:r>
+            <a:r>
+              <a:rPr lang="pt-BR" sz="2800" dirty="0" smtClean="0"/>
+              <a:t>quando a </a:t>
+            </a:r>
+            <a:r>
+              <a:rPr lang="pt-BR" sz="2800" dirty="0"/>
+              <a:t>palavra é </a:t>
+            </a:r>
+            <a:r>
+              <a:rPr lang="pt-BR" sz="2800" dirty="0" smtClean="0"/>
+              <a:t>lida</a:t>
+            </a:r>
+            <a:r>
+              <a:rPr lang="pt-BR" sz="2800" dirty="0" smtClean="0"/>
+              <a:t> </a:t>
+            </a:r>
+            <a:r>
+              <a:rPr lang="pt-BR" sz="2800" dirty="0"/>
+              <a:t>da direita para esquerda ou da esquerda para direita </a:t>
+            </a:r>
+            <a:r>
+              <a:rPr lang="pt-BR" sz="2800" dirty="0" smtClean="0"/>
+              <a:t>e continua com a mesma sequencia de caracteres </a:t>
+            </a:r>
+            <a:r>
+              <a:rPr lang="pt-BR" sz="2800" dirty="0" smtClean="0"/>
+              <a:t>, significa que </a:t>
+            </a:r>
+            <a:r>
+              <a:rPr lang="pt-BR" sz="2800" dirty="0" smtClean="0"/>
+              <a:t> se  trata  de  um palíndromo.</a:t>
+            </a:r>
+            <a:endParaRPr lang="pt-BR" sz="2800" dirty="0"/>
           </a:p>
           <a:p>
             <a:pPr algn="just"/>
@@ -4268,8 +4301,45 @@
             <a:pPr algn="just"/>
             <a:r>
               <a:rPr lang="pt-BR" sz="2800" dirty="0"/>
-              <a:t>	Diante disso, ao comparar as sintaxes e estratégias de programação das linguagens com níveis diferentes, desde as que mais se aproximam da forma que o computador “compreende” o código até linguagens que se aproximam mais da escrita humana.</a:t>
-            </a:r>
+              <a:t>	Diante disso</a:t>
+            </a:r>
+            <a:r>
+              <a:rPr lang="pt-BR" sz="2800" dirty="0"/>
+              <a:t>, </a:t>
+            </a:r>
+            <a:r>
+              <a:rPr lang="pt-BR" sz="2800" dirty="0" smtClean="0"/>
+              <a:t>é possível </a:t>
+            </a:r>
+            <a:r>
+              <a:rPr lang="pt-BR" sz="2800" dirty="0" smtClean="0"/>
+              <a:t>comparar </a:t>
+            </a:r>
+            <a:r>
+              <a:rPr lang="pt-BR" sz="2800" dirty="0"/>
+              <a:t>as sintaxes e estratégias de programação das linguagens com níveis diferentes</a:t>
+            </a:r>
+            <a:r>
+              <a:rPr lang="pt-BR" sz="2800" dirty="0" smtClean="0"/>
+              <a:t>, desde as que mais se aproximam da forma que o computador “compreende” o código até </a:t>
+            </a:r>
+            <a:r>
+              <a:rPr lang="pt-BR" sz="2800" dirty="0" smtClean="0"/>
+              <a:t>as</a:t>
+            </a:r>
+            <a:r>
+              <a:rPr lang="pt-BR" sz="2800" dirty="0" smtClean="0"/>
+              <a:t> que se </a:t>
+            </a:r>
+            <a:r>
+              <a:rPr lang="pt-BR" sz="2800" dirty="0" smtClean="0"/>
+              <a:t>parecem </a:t>
+            </a:r>
+            <a:r>
+              <a:rPr lang="pt-BR" sz="2800" dirty="0" smtClean="0"/>
+              <a:t>mais com a escrita humana.</a:t>
+            </a:r>
+            <a:endParaRPr lang="pt-BR" sz="2800" dirty="0"/>
           </a:p>
         </p:txBody>
       </p:sp>
@@ -4526,7 +4596,7 @@
           <p:cNvPr id="3" name="Imagem 2">
             <a:extLst>
               <a:ext uri="{FF2B5EF4-FFF2-40B4-BE49-F238E27FC236}">
-                <a16:creationId xmlns:a16="http://schemas.microsoft.com/office/drawing/2014/main" id="{7D01A56F-0006-4E08-BDD4-3D93215DCBFE}"/>
+                <a16:creationId xmlns:a16="http://schemas.microsoft.com/office/drawing/2014/main" xmlns="" id="{7D01A56F-0006-4E08-BDD4-3D93215DCBFE}"/>
               </a:ext>
             </a:extLst>
           </p:cNvPr>
@@ -4556,7 +4626,7 @@
           <p:cNvPr id="58" name="Agrupar 57">
             <a:extLst>
               <a:ext uri="{FF2B5EF4-FFF2-40B4-BE49-F238E27FC236}">
-                <a16:creationId xmlns:a16="http://schemas.microsoft.com/office/drawing/2014/main" id="{B7D61FFD-C7E9-4F3F-AFEF-603209667458}"/>
+                <a16:creationId xmlns:a16="http://schemas.microsoft.com/office/drawing/2014/main" xmlns="" id="{B7D61FFD-C7E9-4F3F-AFEF-603209667458}"/>
               </a:ext>
             </a:extLst>
           </p:cNvPr>
@@ -4606,7 +4676,7 @@
             <p:cNvPr id="55" name="Imagem 54">
               <a:extLst>
                 <a:ext uri="{FF2B5EF4-FFF2-40B4-BE49-F238E27FC236}">
-                  <a16:creationId xmlns:a16="http://schemas.microsoft.com/office/drawing/2014/main" id="{60A4F36A-EDE3-4280-85EF-009DD40B8C19}"/>
+                  <a16:creationId xmlns:a16="http://schemas.microsoft.com/office/drawing/2014/main" xmlns="" id="{60A4F36A-EDE3-4280-85EF-009DD40B8C19}"/>
                 </a:ext>
               </a:extLst>
             </p:cNvPr>
@@ -4637,7 +4707,7 @@
           <p:cNvPr id="26" name="Round Diagonal Corner Rectangle 38">
             <a:extLst>
               <a:ext uri="{FF2B5EF4-FFF2-40B4-BE49-F238E27FC236}">
-                <a16:creationId xmlns:a16="http://schemas.microsoft.com/office/drawing/2014/main" id="{72295083-9061-48E5-9B97-E392416B01DA}"/>
+                <a16:creationId xmlns:a16="http://schemas.microsoft.com/office/drawing/2014/main" xmlns="" id="{72295083-9061-48E5-9B97-E392416B01DA}"/>
               </a:ext>
             </a:extLst>
           </p:cNvPr>
@@ -4690,7 +4760,7 @@
           <p:cNvPr id="27" name="CaixaDeTexto 37">
             <a:extLst>
               <a:ext uri="{FF2B5EF4-FFF2-40B4-BE49-F238E27FC236}">
-                <a16:creationId xmlns:a16="http://schemas.microsoft.com/office/drawing/2014/main" id="{9FDF1E56-CFC5-48DC-BE75-4BABB4B9F4C9}"/>
+                <a16:creationId xmlns:a16="http://schemas.microsoft.com/office/drawing/2014/main" xmlns="" id="{9FDF1E56-CFC5-48DC-BE75-4BABB4B9F4C9}"/>
               </a:ext>
             </a:extLst>
           </p:cNvPr>
@@ -4727,7 +4797,15 @@
             <a:pPr lvl="0" algn="just"/>
             <a:r>
               <a:rPr lang="pt-BR" sz="2800" dirty="0"/>
-              <a:t>	 Assim, ao almejar o mesmo objetivo de verificação do palíndromo com linguagens menos usadas, atualmente, até as mais usadas, percebemos que alguns códigos são relativamente simples de serem compreendidos, já outros são mais abstratos e difíceis de serem entendidos porém, mesmo com diferenças significativas, é possível chegar ao mesmo resultado. </a:t>
+              <a:t>	 Assim, ao almejar o mesmo objetivo de verificação do palíndromo com linguagens menos usadas, atualmente, até as mais usadas, percebemos que alguns códigos são relativamente simples de serem compreendidos, já outros são mais </a:t>
+            </a:r>
+            <a:r>
+              <a:rPr lang="pt-BR" sz="2800" dirty="0" smtClean="0"/>
+              <a:t> abstratos </a:t>
+            </a:r>
+            <a:r>
+              <a:rPr lang="pt-BR" sz="2800" dirty="0"/>
+              <a:t>e difíceis de serem entendidos porém, mesmo com diferenças significativas, é possível chegar ao mesmo resultado. </a:t>
             </a:r>
           </a:p>
         </p:txBody>
@@ -5354,7 +5432,7 @@
   <a:extraClrSchemeLst/>
   <a:extLst>
     <a:ext uri="{05A4C25C-085E-4340-85A3-A5531E510DB2}">
-      <thm15:themeFamily xmlns:thm15="http://schemas.microsoft.com/office/thememl/2012/main" name="Office Theme" id="{62F939B6-93AF-4DB8-9C6B-D6C7DFDC589F}" vid="{4A3C46E8-61CC-4603-A589-7422A47A8E4A}"/>
+      <thm15:themeFamily xmlns:thm15="http://schemas.microsoft.com/office/thememl/2012/main" xmlns="" name="Office Theme" id="{62F939B6-93AF-4DB8-9C6B-D6C7DFDC589F}" vid="{4A3C46E8-61CC-4603-A589-7422A47A8E4A}"/>
     </a:ext>
   </a:extLst>
 </a:theme>

</xml_diff>